<commit_message>
checkpoint after completing introduction
</commit_message>
<xml_diff>
--- a/docs_source/images/big_picture_chart.pptx
+++ b/docs_source/images/big_picture_chart.pptx
@@ -112,29 +112,117 @@
 </p:presentation>
 </file>
 
+<file path=ppt/revisionInfo.xml><?xml version="1.0" encoding="utf-8"?>
+<p1510:revInfo xmlns:a="http://schemas.openxmlformats.org/drawingml/2006/main" xmlns:r="http://schemas.openxmlformats.org/officeDocument/2006/relationships" xmlns:p1510="http://schemas.microsoft.com/office/powerpoint/2015/10/main">
+  <p1510:revLst>
+    <p1510:client id="{96EB9757-FB40-9142-88E1-FF20CE49C1E7}" v="20" dt="2024-02-06T18:46:48.790"/>
+  </p1510:revLst>
+</p1510:revInfo>
+</file>
+
 <file path=ppt/changesInfos/changesInfo1.xml><?xml version="1.0" encoding="utf-8"?>
 <pc:chgInfo xmlns:a="http://schemas.openxmlformats.org/drawingml/2006/main" xmlns:r="http://schemas.openxmlformats.org/officeDocument/2006/relationships" xmlns:ac="http://schemas.microsoft.com/office/drawing/2013/main/command" xmlns:pc="http://schemas.microsoft.com/office/powerpoint/2013/main/command">
   <pc:docChgLst>
     <pc:chgData name="Victor De Lima" userId="80df215475e1885c" providerId="LiveId" clId="{96EB9757-FB40-9142-88E1-FF20CE49C1E7}"/>
-    <pc:docChg chg="modSld">
-      <pc:chgData name="Victor De Lima" userId="80df215475e1885c" providerId="LiveId" clId="{96EB9757-FB40-9142-88E1-FF20CE49C1E7}" dt="2024-02-05T01:07:22.887" v="12" actId="20577"/>
+    <pc:docChg chg="undo custSel modSld">
+      <pc:chgData name="Victor De Lima" userId="80df215475e1885c" providerId="LiveId" clId="{96EB9757-FB40-9142-88E1-FF20CE49C1E7}" dt="2024-02-06T18:54:40.839" v="975" actId="14100"/>
       <pc:docMkLst>
         <pc:docMk/>
       </pc:docMkLst>
-      <pc:sldChg chg="modSp mod">
-        <pc:chgData name="Victor De Lima" userId="80df215475e1885c" providerId="LiveId" clId="{96EB9757-FB40-9142-88E1-FF20CE49C1E7}" dt="2024-02-05T01:07:22.887" v="12" actId="20577"/>
+      <pc:sldChg chg="addSp modSp mod">
+        <pc:chgData name="Victor De Lima" userId="80df215475e1885c" providerId="LiveId" clId="{96EB9757-FB40-9142-88E1-FF20CE49C1E7}" dt="2024-02-06T18:54:40.839" v="975" actId="14100"/>
         <pc:sldMkLst>
           <pc:docMk/>
           <pc:sldMk cId="1999065095" sldId="256"/>
         </pc:sldMkLst>
+        <pc:spChg chg="add mod">
+          <ac:chgData name="Victor De Lima" userId="80df215475e1885c" providerId="LiveId" clId="{96EB9757-FB40-9142-88E1-FF20CE49C1E7}" dt="2024-02-06T18:47:08.216" v="520" actId="1038"/>
+          <ac:spMkLst>
+            <pc:docMk/>
+            <pc:sldMk cId="1999065095" sldId="256"/>
+            <ac:spMk id="2" creationId="{C8A6CBDB-8B64-9E96-E128-7BBA10D1DEF6}"/>
+          </ac:spMkLst>
+        </pc:spChg>
+        <pc:spChg chg="add mod">
+          <ac:chgData name="Victor De Lima" userId="80df215475e1885c" providerId="LiveId" clId="{96EB9757-FB40-9142-88E1-FF20CE49C1E7}" dt="2024-02-06T18:46:48.790" v="517" actId="167"/>
+          <ac:spMkLst>
+            <pc:docMk/>
+            <pc:sldMk cId="1999065095" sldId="256"/>
+            <ac:spMk id="3" creationId="{60A2E805-24A8-C0F7-56E0-0944C6813F48}"/>
+          </ac:spMkLst>
+        </pc:spChg>
+        <pc:spChg chg="add mod">
+          <ac:chgData name="Victor De Lima" userId="80df215475e1885c" providerId="LiveId" clId="{96EB9757-FB40-9142-88E1-FF20CE49C1E7}" dt="2024-02-06T18:46:43.190" v="516" actId="167"/>
+          <ac:spMkLst>
+            <pc:docMk/>
+            <pc:sldMk cId="1999065095" sldId="256"/>
+            <ac:spMk id="5" creationId="{737FB424-50D8-76E7-80E1-00E34AA1BB17}"/>
+          </ac:spMkLst>
+        </pc:spChg>
+        <pc:spChg chg="add mod">
+          <ac:chgData name="Victor De Lima" userId="80df215475e1885c" providerId="LiveId" clId="{96EB9757-FB40-9142-88E1-FF20CE49C1E7}" dt="2024-02-06T18:46:32.382" v="515" actId="167"/>
+          <ac:spMkLst>
+            <pc:docMk/>
+            <pc:sldMk cId="1999065095" sldId="256"/>
+            <ac:spMk id="6" creationId="{D9B9DF88-AA6D-D658-4BF0-3310980755D7}"/>
+          </ac:spMkLst>
+        </pc:spChg>
+        <pc:spChg chg="add mod">
+          <ac:chgData name="Victor De Lima" userId="80df215475e1885c" providerId="LiveId" clId="{96EB9757-FB40-9142-88E1-FF20CE49C1E7}" dt="2024-02-06T18:46:25.732" v="514" actId="167"/>
+          <ac:spMkLst>
+            <pc:docMk/>
+            <pc:sldMk cId="1999065095" sldId="256"/>
+            <ac:spMk id="7" creationId="{85642016-F213-B53C-3F8C-3CDC060C2D3D}"/>
+          </ac:spMkLst>
+        </pc:spChg>
         <pc:spChg chg="mod">
-          <ac:chgData name="Victor De Lima" userId="80df215475e1885c" providerId="LiveId" clId="{96EB9757-FB40-9142-88E1-FF20CE49C1E7}" dt="2024-02-05T01:07:22.887" v="12" actId="20577"/>
+          <ac:chgData name="Victor De Lima" userId="80df215475e1885c" providerId="LiveId" clId="{96EB9757-FB40-9142-88E1-FF20CE49C1E7}" dt="2024-02-06T18:43:40.057" v="248" actId="14100"/>
+          <ac:spMkLst>
+            <pc:docMk/>
+            <pc:sldMk cId="1999065095" sldId="256"/>
+            <ac:spMk id="46" creationId="{CDA432F8-094C-F07C-F214-26F585D938DC}"/>
+          </ac:spMkLst>
+        </pc:spChg>
+        <pc:spChg chg="mod">
+          <ac:chgData name="Victor De Lima" userId="80df215475e1885c" providerId="LiveId" clId="{96EB9757-FB40-9142-88E1-FF20CE49C1E7}" dt="2024-02-06T18:48:15.188" v="603" actId="14100"/>
+          <ac:spMkLst>
+            <pc:docMk/>
+            <pc:sldMk cId="1999065095" sldId="256"/>
+            <ac:spMk id="47" creationId="{D7CC336E-60AD-60E9-195E-87D5A9A3EB26}"/>
+          </ac:spMkLst>
+        </pc:spChg>
+        <pc:spChg chg="mod">
+          <ac:chgData name="Victor De Lima" userId="80df215475e1885c" providerId="LiveId" clId="{96EB9757-FB40-9142-88E1-FF20CE49C1E7}" dt="2024-02-06T18:54:36.316" v="973" actId="14100"/>
+          <ac:spMkLst>
+            <pc:docMk/>
+            <pc:sldMk cId="1999065095" sldId="256"/>
+            <ac:spMk id="48" creationId="{87A54DA6-4E13-5387-15D9-3E705B2C2100}"/>
+          </ac:spMkLst>
+        </pc:spChg>
+        <pc:spChg chg="mod">
+          <ac:chgData name="Victor De Lima" userId="80df215475e1885c" providerId="LiveId" clId="{96EB9757-FB40-9142-88E1-FF20CE49C1E7}" dt="2024-02-06T18:54:38.353" v="974" actId="14100"/>
+          <ac:spMkLst>
+            <pc:docMk/>
+            <pc:sldMk cId="1999065095" sldId="256"/>
+            <ac:spMk id="49" creationId="{403BF609-329D-AEC5-54B3-1C01E33D86AB}"/>
+          </ac:spMkLst>
+        </pc:spChg>
+        <pc:spChg chg="mod">
+          <ac:chgData name="Victor De Lima" userId="80df215475e1885c" providerId="LiveId" clId="{96EB9757-FB40-9142-88E1-FF20CE49C1E7}" dt="2024-02-06T18:54:40.839" v="975" actId="14100"/>
           <ac:spMkLst>
             <pc:docMk/>
             <pc:sldMk cId="1999065095" sldId="256"/>
             <ac:spMk id="50" creationId="{303A75ED-E444-A7C4-F7F6-4497EB13BFD6}"/>
           </ac:spMkLst>
         </pc:spChg>
+        <pc:grpChg chg="add">
+          <ac:chgData name="Victor De Lima" userId="80df215475e1885c" providerId="LiveId" clId="{96EB9757-FB40-9142-88E1-FF20CE49C1E7}" dt="2024-02-06T18:47:03.947" v="518" actId="164"/>
+          <ac:grpSpMkLst>
+            <pc:docMk/>
+            <pc:sldMk cId="1999065095" sldId="256"/>
+            <ac:grpSpMk id="9" creationId="{72BFF517-2BC6-FCE7-ED2F-BD6EDA867F7F}"/>
+          </ac:grpSpMkLst>
+        </pc:grpChg>
       </pc:sldChg>
     </pc:docChg>
   </pc:docChgLst>
@@ -288,7 +376,7 @@
           <a:p>
             <a:fld id="{B81C60C9-EF89-0249-B5F5-EEF298432C7B}" type="datetimeFigureOut">
               <a:rPr lang="en-US" smtClean="0"/>
-              <a:t>2/4/24</a:t>
+              <a:t>2/6/24</a:t>
             </a:fld>
             <a:endParaRPr lang="en-US"/>
           </a:p>
@@ -486,7 +574,7 @@
           <a:p>
             <a:fld id="{B81C60C9-EF89-0249-B5F5-EEF298432C7B}" type="datetimeFigureOut">
               <a:rPr lang="en-US" smtClean="0"/>
-              <a:t>2/4/24</a:t>
+              <a:t>2/6/24</a:t>
             </a:fld>
             <a:endParaRPr lang="en-US"/>
           </a:p>
@@ -694,7 +782,7 @@
           <a:p>
             <a:fld id="{B81C60C9-EF89-0249-B5F5-EEF298432C7B}" type="datetimeFigureOut">
               <a:rPr lang="en-US" smtClean="0"/>
-              <a:t>2/4/24</a:t>
+              <a:t>2/6/24</a:t>
             </a:fld>
             <a:endParaRPr lang="en-US"/>
           </a:p>
@@ -892,7 +980,7 @@
           <a:p>
             <a:fld id="{B81C60C9-EF89-0249-B5F5-EEF298432C7B}" type="datetimeFigureOut">
               <a:rPr lang="en-US" smtClean="0"/>
-              <a:t>2/4/24</a:t>
+              <a:t>2/6/24</a:t>
             </a:fld>
             <a:endParaRPr lang="en-US"/>
           </a:p>
@@ -1167,7 +1255,7 @@
           <a:p>
             <a:fld id="{B81C60C9-EF89-0249-B5F5-EEF298432C7B}" type="datetimeFigureOut">
               <a:rPr lang="en-US" smtClean="0"/>
-              <a:t>2/4/24</a:t>
+              <a:t>2/6/24</a:t>
             </a:fld>
             <a:endParaRPr lang="en-US"/>
           </a:p>
@@ -1432,7 +1520,7 @@
           <a:p>
             <a:fld id="{B81C60C9-EF89-0249-B5F5-EEF298432C7B}" type="datetimeFigureOut">
               <a:rPr lang="en-US" smtClean="0"/>
-              <a:t>2/4/24</a:t>
+              <a:t>2/6/24</a:t>
             </a:fld>
             <a:endParaRPr lang="en-US"/>
           </a:p>
@@ -1844,7 +1932,7 @@
           <a:p>
             <a:fld id="{B81C60C9-EF89-0249-B5F5-EEF298432C7B}" type="datetimeFigureOut">
               <a:rPr lang="en-US" smtClean="0"/>
-              <a:t>2/4/24</a:t>
+              <a:t>2/6/24</a:t>
             </a:fld>
             <a:endParaRPr lang="en-US"/>
           </a:p>
@@ -1985,7 +2073,7 @@
           <a:p>
             <a:fld id="{B81C60C9-EF89-0249-B5F5-EEF298432C7B}" type="datetimeFigureOut">
               <a:rPr lang="en-US" smtClean="0"/>
-              <a:t>2/4/24</a:t>
+              <a:t>2/6/24</a:t>
             </a:fld>
             <a:endParaRPr lang="en-US"/>
           </a:p>
@@ -2098,7 +2186,7 @@
           <a:p>
             <a:fld id="{B81C60C9-EF89-0249-B5F5-EEF298432C7B}" type="datetimeFigureOut">
               <a:rPr lang="en-US" smtClean="0"/>
-              <a:t>2/4/24</a:t>
+              <a:t>2/6/24</a:t>
             </a:fld>
             <a:endParaRPr lang="en-US"/>
           </a:p>
@@ -2409,7 +2497,7 @@
           <a:p>
             <a:fld id="{B81C60C9-EF89-0249-B5F5-EEF298432C7B}" type="datetimeFigureOut">
               <a:rPr lang="en-US" smtClean="0"/>
-              <a:t>2/4/24</a:t>
+              <a:t>2/6/24</a:t>
             </a:fld>
             <a:endParaRPr lang="en-US"/>
           </a:p>
@@ -2697,7 +2785,7 @@
           <a:p>
             <a:fld id="{B81C60C9-EF89-0249-B5F5-EEF298432C7B}" type="datetimeFigureOut">
               <a:rPr lang="en-US" smtClean="0"/>
-              <a:t>2/4/24</a:t>
+              <a:t>2/6/24</a:t>
             </a:fld>
             <a:endParaRPr lang="en-US"/>
           </a:p>
@@ -2938,7 +3026,7 @@
           <a:p>
             <a:fld id="{B81C60C9-EF89-0249-B5F5-EEF298432C7B}" type="datetimeFigureOut">
               <a:rPr lang="en-US" smtClean="0"/>
-              <a:t>2/4/24</a:t>
+              <a:t>2/6/24</a:t>
             </a:fld>
             <a:endParaRPr lang="en-US"/>
           </a:p>
@@ -3357,10 +3445,10 @@
       </p:grpSpPr>
       <p:grpSp>
         <p:nvGrpSpPr>
-          <p:cNvPr id="72" name="Group 71">
-            <a:extLst>
-              <a:ext uri="{FF2B5EF4-FFF2-40B4-BE49-F238E27FC236}">
-                <a16:creationId xmlns:a16="http://schemas.microsoft.com/office/drawing/2014/main" id="{2D61AEBD-20CD-F741-3099-73C26C4ECC77}"/>
+          <p:cNvPr id="9" name="Group 8">
+            <a:extLst>
+              <a:ext uri="{FF2B5EF4-FFF2-40B4-BE49-F238E27FC236}">
+                <a16:creationId xmlns:a16="http://schemas.microsoft.com/office/drawing/2014/main" id="{72BFF517-2BC6-FCE7-ED2F-BD6EDA867F7F}"/>
               </a:ext>
             </a:extLst>
           </p:cNvPr>
@@ -3369,38 +3457,705 @@
         </p:nvGrpSpPr>
         <p:grpSpPr>
           <a:xfrm>
-            <a:off x="535994" y="3322131"/>
-            <a:ext cx="11096955" cy="1638541"/>
-            <a:chOff x="535994" y="4071939"/>
-            <a:chExt cx="11096955" cy="1638541"/>
+            <a:off x="252762" y="304841"/>
+            <a:ext cx="11715536" cy="5889898"/>
+            <a:chOff x="252762" y="304841"/>
+            <a:chExt cx="11715536" cy="5889898"/>
           </a:xfrm>
-          <a:solidFill>
-            <a:schemeClr val="bg1"/>
-          </a:solidFill>
         </p:grpSpPr>
         <p:sp>
           <p:nvSpPr>
-            <p:cNvPr id="57" name="Oval 56">
+            <p:cNvPr id="3" name="Rectangle 2">
               <a:extLst>
                 <a:ext uri="{FF2B5EF4-FFF2-40B4-BE49-F238E27FC236}">
-                  <a16:creationId xmlns:a16="http://schemas.microsoft.com/office/drawing/2014/main" id="{7FE923A1-89F6-E9FE-E045-E0A592AEF767}"/>
+                  <a16:creationId xmlns:a16="http://schemas.microsoft.com/office/drawing/2014/main" id="{60A2E805-24A8-C0F7-56E0-0944C6813F48}"/>
                 </a:ext>
               </a:extLst>
             </p:cNvPr>
-            <p:cNvSpPr>
-              <a:spLocks noChangeAspect="1"/>
-            </p:cNvSpPr>
+            <p:cNvSpPr/>
             <p:nvPr/>
           </p:nvSpPr>
           <p:spPr>
             <a:xfrm>
-              <a:off x="535994" y="4126480"/>
-              <a:ext cx="1584000" cy="1584000"/>
+              <a:off x="4107986" y="3397848"/>
+              <a:ext cx="720000" cy="216000"/>
             </a:xfrm>
-            <a:prstGeom prst="ellipse">
+            <a:prstGeom prst="rect">
               <a:avLst/>
             </a:prstGeom>
-            <a:grpFill/>
+            <a:solidFill>
+              <a:schemeClr val="bg1"/>
+            </a:solidFill>
+            <a:ln>
+              <a:solidFill>
+                <a:srgbClr val="2AA0D6"/>
+              </a:solidFill>
+            </a:ln>
+          </p:spPr>
+          <p:style>
+            <a:lnRef idx="2">
+              <a:schemeClr val="accent1">
+                <a:shade val="15000"/>
+              </a:schemeClr>
+            </a:lnRef>
+            <a:fillRef idx="1">
+              <a:schemeClr val="accent1"/>
+            </a:fillRef>
+            <a:effectRef idx="0">
+              <a:schemeClr val="accent1"/>
+            </a:effectRef>
+            <a:fontRef idx="minor">
+              <a:schemeClr val="lt1"/>
+            </a:fontRef>
+          </p:style>
+          <p:txBody>
+            <a:bodyPr lIns="0" tIns="0" rIns="0" bIns="0" rtlCol="0" anchor="ctr"/>
+            <a:lstStyle/>
+            <a:p>
+              <a:pPr algn="ctr"/>
+              <a:r>
+                <a:rPr lang="en-US" sz="1000" dirty="0">
+                  <a:solidFill>
+                    <a:srgbClr val="2AA0D6"/>
+                  </a:solidFill>
+                  <a:latin typeface="Segoe UI" panose="020B0502040204020203" pitchFamily="34" charset="0"/>
+                  <a:cs typeface="Segoe UI" panose="020B0502040204020203" pitchFamily="34" charset="0"/>
+                </a:rPr>
+                <a:t>Venus</a:t>
+              </a:r>
+              <a:endParaRPr lang="en-US" sz="800" dirty="0">
+                <a:solidFill>
+                  <a:srgbClr val="2AA0D6"/>
+                </a:solidFill>
+                <a:latin typeface="Segoe UI" panose="020B0502040204020203" pitchFamily="34" charset="0"/>
+                <a:cs typeface="Segoe UI" panose="020B0502040204020203" pitchFamily="34" charset="0"/>
+              </a:endParaRPr>
+            </a:p>
+          </p:txBody>
+        </p:sp>
+        <p:sp>
+          <p:nvSpPr>
+            <p:cNvPr id="5" name="Rectangle 4">
+              <a:extLst>
+                <a:ext uri="{FF2B5EF4-FFF2-40B4-BE49-F238E27FC236}">
+                  <a16:creationId xmlns:a16="http://schemas.microsoft.com/office/drawing/2014/main" id="{737FB424-50D8-76E7-80E1-00E34AA1BB17}"/>
+                </a:ext>
+              </a:extLst>
+            </p:cNvPr>
+            <p:cNvSpPr/>
+            <p:nvPr/>
+          </p:nvSpPr>
+          <p:spPr>
+            <a:xfrm>
+              <a:off x="6553878" y="3385358"/>
+              <a:ext cx="720000" cy="216000"/>
+            </a:xfrm>
+            <a:prstGeom prst="rect">
+              <a:avLst/>
+            </a:prstGeom>
+            <a:solidFill>
+              <a:schemeClr val="bg1"/>
+            </a:solidFill>
+            <a:ln>
+              <a:solidFill>
+                <a:srgbClr val="2AA0D6"/>
+              </a:solidFill>
+            </a:ln>
+          </p:spPr>
+          <p:style>
+            <a:lnRef idx="2">
+              <a:schemeClr val="accent1">
+                <a:shade val="15000"/>
+              </a:schemeClr>
+            </a:lnRef>
+            <a:fillRef idx="1">
+              <a:schemeClr val="accent1"/>
+            </a:fillRef>
+            <a:effectRef idx="0">
+              <a:schemeClr val="accent1"/>
+            </a:effectRef>
+            <a:fontRef idx="minor">
+              <a:schemeClr val="lt1"/>
+            </a:fontRef>
+          </p:style>
+          <p:txBody>
+            <a:bodyPr lIns="0" tIns="0" rIns="0" bIns="0" rtlCol="0" anchor="ctr"/>
+            <a:lstStyle/>
+            <a:p>
+              <a:pPr algn="ctr"/>
+              <a:r>
+                <a:rPr lang="en-US" sz="1000" dirty="0">
+                  <a:solidFill>
+                    <a:srgbClr val="2AA0D6"/>
+                  </a:solidFill>
+                  <a:latin typeface="Segoe UI" panose="020B0502040204020203" pitchFamily="34" charset="0"/>
+                  <a:cs typeface="Segoe UI" panose="020B0502040204020203" pitchFamily="34" charset="0"/>
+                </a:rPr>
+                <a:t>Earth</a:t>
+              </a:r>
+              <a:endParaRPr lang="en-US" sz="800" dirty="0">
+                <a:solidFill>
+                  <a:srgbClr val="2AA0D6"/>
+                </a:solidFill>
+                <a:latin typeface="Segoe UI" panose="020B0502040204020203" pitchFamily="34" charset="0"/>
+                <a:cs typeface="Segoe UI" panose="020B0502040204020203" pitchFamily="34" charset="0"/>
+              </a:endParaRPr>
+            </a:p>
+          </p:txBody>
+        </p:sp>
+        <p:sp>
+          <p:nvSpPr>
+            <p:cNvPr id="6" name="Rectangle 5">
+              <a:extLst>
+                <a:ext uri="{FF2B5EF4-FFF2-40B4-BE49-F238E27FC236}">
+                  <a16:creationId xmlns:a16="http://schemas.microsoft.com/office/drawing/2014/main" id="{D9B9DF88-AA6D-D658-4BF0-3310980755D7}"/>
+                </a:ext>
+              </a:extLst>
+            </p:cNvPr>
+            <p:cNvSpPr/>
+            <p:nvPr/>
+          </p:nvSpPr>
+          <p:spPr>
+            <a:xfrm>
+              <a:off x="8862368" y="3400348"/>
+              <a:ext cx="720000" cy="216000"/>
+            </a:xfrm>
+            <a:prstGeom prst="rect">
+              <a:avLst/>
+            </a:prstGeom>
+            <a:solidFill>
+              <a:schemeClr val="bg1"/>
+            </a:solidFill>
+            <a:ln>
+              <a:solidFill>
+                <a:srgbClr val="2AA0D6"/>
+              </a:solidFill>
+            </a:ln>
+          </p:spPr>
+          <p:style>
+            <a:lnRef idx="2">
+              <a:schemeClr val="accent1">
+                <a:shade val="15000"/>
+              </a:schemeClr>
+            </a:lnRef>
+            <a:fillRef idx="1">
+              <a:schemeClr val="accent1"/>
+            </a:fillRef>
+            <a:effectRef idx="0">
+              <a:schemeClr val="accent1"/>
+            </a:effectRef>
+            <a:fontRef idx="minor">
+              <a:schemeClr val="lt1"/>
+            </a:fontRef>
+          </p:style>
+          <p:txBody>
+            <a:bodyPr lIns="0" tIns="0" rIns="0" bIns="0" rtlCol="0" anchor="ctr"/>
+            <a:lstStyle/>
+            <a:p>
+              <a:pPr algn="ctr"/>
+              <a:r>
+                <a:rPr lang="en-US" sz="1000" dirty="0">
+                  <a:solidFill>
+                    <a:srgbClr val="2AA0D6"/>
+                  </a:solidFill>
+                  <a:latin typeface="Segoe UI" panose="020B0502040204020203" pitchFamily="34" charset="0"/>
+                  <a:cs typeface="Segoe UI" panose="020B0502040204020203" pitchFamily="34" charset="0"/>
+                </a:rPr>
+                <a:t>Mars</a:t>
+              </a:r>
+              <a:endParaRPr lang="en-US" sz="800" dirty="0">
+                <a:solidFill>
+                  <a:srgbClr val="2AA0D6"/>
+                </a:solidFill>
+                <a:latin typeface="Segoe UI" panose="020B0502040204020203" pitchFamily="34" charset="0"/>
+                <a:cs typeface="Segoe UI" panose="020B0502040204020203" pitchFamily="34" charset="0"/>
+              </a:endParaRPr>
+            </a:p>
+          </p:txBody>
+        </p:sp>
+        <p:sp>
+          <p:nvSpPr>
+            <p:cNvPr id="7" name="Rectangle 6">
+              <a:extLst>
+                <a:ext uri="{FF2B5EF4-FFF2-40B4-BE49-F238E27FC236}">
+                  <a16:creationId xmlns:a16="http://schemas.microsoft.com/office/drawing/2014/main" id="{85642016-F213-B53C-3F8C-3CDC060C2D3D}"/>
+                </a:ext>
+              </a:extLst>
+            </p:cNvPr>
+            <p:cNvSpPr/>
+            <p:nvPr/>
+          </p:nvSpPr>
+          <p:spPr>
+            <a:xfrm>
+              <a:off x="11248298" y="3402848"/>
+              <a:ext cx="720000" cy="216000"/>
+            </a:xfrm>
+            <a:prstGeom prst="rect">
+              <a:avLst/>
+            </a:prstGeom>
+            <a:solidFill>
+              <a:schemeClr val="bg1"/>
+            </a:solidFill>
+            <a:ln>
+              <a:solidFill>
+                <a:srgbClr val="2AA0D6"/>
+              </a:solidFill>
+            </a:ln>
+          </p:spPr>
+          <p:style>
+            <a:lnRef idx="2">
+              <a:schemeClr val="accent1">
+                <a:shade val="15000"/>
+              </a:schemeClr>
+            </a:lnRef>
+            <a:fillRef idx="1">
+              <a:schemeClr val="accent1"/>
+            </a:fillRef>
+            <a:effectRef idx="0">
+              <a:schemeClr val="accent1"/>
+            </a:effectRef>
+            <a:fontRef idx="minor">
+              <a:schemeClr val="lt1"/>
+            </a:fontRef>
+          </p:style>
+          <p:txBody>
+            <a:bodyPr lIns="0" tIns="0" rIns="0" bIns="0" rtlCol="0" anchor="ctr"/>
+            <a:lstStyle/>
+            <a:p>
+              <a:pPr algn="ctr"/>
+              <a:r>
+                <a:rPr lang="en-US" sz="1000" dirty="0">
+                  <a:solidFill>
+                    <a:srgbClr val="2AA0D6"/>
+                  </a:solidFill>
+                  <a:latin typeface="Segoe UI" panose="020B0502040204020203" pitchFamily="34" charset="0"/>
+                  <a:cs typeface="Segoe UI" panose="020B0502040204020203" pitchFamily="34" charset="0"/>
+                </a:rPr>
+                <a:t>Jupiter</a:t>
+              </a:r>
+              <a:endParaRPr lang="en-US" sz="800" dirty="0">
+                <a:solidFill>
+                  <a:srgbClr val="2AA0D6"/>
+                </a:solidFill>
+                <a:latin typeface="Segoe UI" panose="020B0502040204020203" pitchFamily="34" charset="0"/>
+                <a:cs typeface="Segoe UI" panose="020B0502040204020203" pitchFamily="34" charset="0"/>
+              </a:endParaRPr>
+            </a:p>
+          </p:txBody>
+        </p:sp>
+        <p:sp>
+          <p:nvSpPr>
+            <p:cNvPr id="2" name="Rectangle 1">
+              <a:extLst>
+                <a:ext uri="{FF2B5EF4-FFF2-40B4-BE49-F238E27FC236}">
+                  <a16:creationId xmlns:a16="http://schemas.microsoft.com/office/drawing/2014/main" id="{C8A6CBDB-8B64-9E96-E128-7BBA10D1DEF6}"/>
+                </a:ext>
+              </a:extLst>
+            </p:cNvPr>
+            <p:cNvSpPr/>
+            <p:nvPr/>
+          </p:nvSpPr>
+          <p:spPr>
+            <a:xfrm>
+              <a:off x="1767022" y="3410338"/>
+              <a:ext cx="720000" cy="216000"/>
+            </a:xfrm>
+            <a:prstGeom prst="rect">
+              <a:avLst/>
+            </a:prstGeom>
+            <a:solidFill>
+              <a:schemeClr val="bg1"/>
+            </a:solidFill>
+            <a:ln>
+              <a:solidFill>
+                <a:srgbClr val="2AA0D6"/>
+              </a:solidFill>
+            </a:ln>
+          </p:spPr>
+          <p:style>
+            <a:lnRef idx="2">
+              <a:schemeClr val="accent1">
+                <a:shade val="15000"/>
+              </a:schemeClr>
+            </a:lnRef>
+            <a:fillRef idx="1">
+              <a:schemeClr val="accent1"/>
+            </a:fillRef>
+            <a:effectRef idx="0">
+              <a:schemeClr val="accent1"/>
+            </a:effectRef>
+            <a:fontRef idx="minor">
+              <a:schemeClr val="lt1"/>
+            </a:fontRef>
+          </p:style>
+          <p:txBody>
+            <a:bodyPr lIns="0" tIns="0" rIns="0" bIns="0" rtlCol="0" anchor="ctr"/>
+            <a:lstStyle/>
+            <a:p>
+              <a:pPr algn="ctr"/>
+              <a:r>
+                <a:rPr lang="en-US" sz="1000" dirty="0">
+                  <a:solidFill>
+                    <a:srgbClr val="2AA0D6"/>
+                  </a:solidFill>
+                  <a:latin typeface="Segoe UI" panose="020B0502040204020203" pitchFamily="34" charset="0"/>
+                  <a:cs typeface="Segoe UI" panose="020B0502040204020203" pitchFamily="34" charset="0"/>
+                </a:rPr>
+                <a:t>Mercury</a:t>
+              </a:r>
+              <a:endParaRPr lang="en-US" sz="800" dirty="0">
+                <a:solidFill>
+                  <a:srgbClr val="2AA0D6"/>
+                </a:solidFill>
+                <a:latin typeface="Segoe UI" panose="020B0502040204020203" pitchFamily="34" charset="0"/>
+                <a:cs typeface="Segoe UI" panose="020B0502040204020203" pitchFamily="34" charset="0"/>
+              </a:endParaRPr>
+            </a:p>
+          </p:txBody>
+        </p:sp>
+        <p:grpSp>
+          <p:nvGrpSpPr>
+            <p:cNvPr id="72" name="Group 71">
+              <a:extLst>
+                <a:ext uri="{FF2B5EF4-FFF2-40B4-BE49-F238E27FC236}">
+                  <a16:creationId xmlns:a16="http://schemas.microsoft.com/office/drawing/2014/main" id="{2D61AEBD-20CD-F741-3099-73C26C4ECC77}"/>
+                </a:ext>
+              </a:extLst>
+            </p:cNvPr>
+            <p:cNvGrpSpPr/>
+            <p:nvPr/>
+          </p:nvGrpSpPr>
+          <p:grpSpPr>
+            <a:xfrm>
+              <a:off x="535994" y="3322131"/>
+              <a:ext cx="11096955" cy="1638541"/>
+              <a:chOff x="535994" y="4071939"/>
+              <a:chExt cx="11096955" cy="1638541"/>
+            </a:xfrm>
+            <a:solidFill>
+              <a:schemeClr val="bg1"/>
+            </a:solidFill>
+          </p:grpSpPr>
+          <p:sp>
+            <p:nvSpPr>
+              <p:cNvPr id="57" name="Oval 56">
+                <a:extLst>
+                  <a:ext uri="{FF2B5EF4-FFF2-40B4-BE49-F238E27FC236}">
+                    <a16:creationId xmlns:a16="http://schemas.microsoft.com/office/drawing/2014/main" id="{7FE923A1-89F6-E9FE-E045-E0A592AEF767}"/>
+                  </a:ext>
+                </a:extLst>
+              </p:cNvPr>
+              <p:cNvSpPr>
+                <a:spLocks noChangeAspect="1"/>
+              </p:cNvSpPr>
+              <p:nvPr/>
+            </p:nvSpPr>
+            <p:spPr>
+              <a:xfrm>
+                <a:off x="535994" y="4126480"/>
+                <a:ext cx="1584000" cy="1584000"/>
+              </a:xfrm>
+              <a:prstGeom prst="ellipse">
+                <a:avLst/>
+              </a:prstGeom>
+              <a:grpFill/>
+              <a:ln>
+                <a:noFill/>
+              </a:ln>
+            </p:spPr>
+            <p:style>
+              <a:lnRef idx="2">
+                <a:schemeClr val="accent1">
+                  <a:shade val="15000"/>
+                </a:schemeClr>
+              </a:lnRef>
+              <a:fillRef idx="1">
+                <a:schemeClr val="accent1"/>
+              </a:fillRef>
+              <a:effectRef idx="0">
+                <a:schemeClr val="accent1"/>
+              </a:effectRef>
+              <a:fontRef idx="minor">
+                <a:schemeClr val="lt1"/>
+              </a:fontRef>
+            </p:style>
+            <p:txBody>
+              <a:bodyPr rtlCol="0" anchor="ctr"/>
+              <a:lstStyle/>
+              <a:p>
+                <a:pPr algn="ctr"/>
+                <a:endParaRPr lang="en-US"/>
+              </a:p>
+            </p:txBody>
+          </p:sp>
+          <p:sp>
+            <p:nvSpPr>
+              <p:cNvPr id="60" name="Oval 59">
+                <a:extLst>
+                  <a:ext uri="{FF2B5EF4-FFF2-40B4-BE49-F238E27FC236}">
+                    <a16:creationId xmlns:a16="http://schemas.microsoft.com/office/drawing/2014/main" id="{640B2652-D139-F524-EEFD-D72A2025C914}"/>
+                  </a:ext>
+                </a:extLst>
+              </p:cNvPr>
+              <p:cNvSpPr>
+                <a:spLocks noChangeAspect="1"/>
+              </p:cNvSpPr>
+              <p:nvPr/>
+            </p:nvSpPr>
+            <p:spPr>
+              <a:xfrm>
+                <a:off x="2914233" y="4126480"/>
+                <a:ext cx="1584000" cy="1584000"/>
+              </a:xfrm>
+              <a:prstGeom prst="ellipse">
+                <a:avLst/>
+              </a:prstGeom>
+              <a:grpFill/>
+              <a:ln>
+                <a:noFill/>
+              </a:ln>
+            </p:spPr>
+            <p:style>
+              <a:lnRef idx="2">
+                <a:schemeClr val="accent1">
+                  <a:shade val="15000"/>
+                </a:schemeClr>
+              </a:lnRef>
+              <a:fillRef idx="1">
+                <a:schemeClr val="accent1"/>
+              </a:fillRef>
+              <a:effectRef idx="0">
+                <a:schemeClr val="accent1"/>
+              </a:effectRef>
+              <a:fontRef idx="minor">
+                <a:schemeClr val="lt1"/>
+              </a:fontRef>
+            </p:style>
+            <p:txBody>
+              <a:bodyPr rtlCol="0" anchor="ctr"/>
+              <a:lstStyle/>
+              <a:p>
+                <a:pPr algn="ctr"/>
+                <a:endParaRPr lang="en-US" dirty="0"/>
+              </a:p>
+            </p:txBody>
+          </p:sp>
+          <p:sp>
+            <p:nvSpPr>
+              <p:cNvPr id="61" name="Oval 60">
+                <a:extLst>
+                  <a:ext uri="{FF2B5EF4-FFF2-40B4-BE49-F238E27FC236}">
+                    <a16:creationId xmlns:a16="http://schemas.microsoft.com/office/drawing/2014/main" id="{3B223EDB-6A4A-0066-94EC-4F6D2BA7F39C}"/>
+                  </a:ext>
+                </a:extLst>
+              </p:cNvPr>
+              <p:cNvSpPr>
+                <a:spLocks noChangeAspect="1"/>
+              </p:cNvSpPr>
+              <p:nvPr/>
+            </p:nvSpPr>
+            <p:spPr>
+              <a:xfrm>
+                <a:off x="5292472" y="4071939"/>
+                <a:ext cx="1584000" cy="1584000"/>
+              </a:xfrm>
+              <a:prstGeom prst="ellipse">
+                <a:avLst/>
+              </a:prstGeom>
+              <a:grpFill/>
+              <a:ln>
+                <a:noFill/>
+              </a:ln>
+            </p:spPr>
+            <p:style>
+              <a:lnRef idx="2">
+                <a:schemeClr val="accent1">
+                  <a:shade val="15000"/>
+                </a:schemeClr>
+              </a:lnRef>
+              <a:fillRef idx="1">
+                <a:schemeClr val="accent1"/>
+              </a:fillRef>
+              <a:effectRef idx="0">
+                <a:schemeClr val="accent1"/>
+              </a:effectRef>
+              <a:fontRef idx="minor">
+                <a:schemeClr val="lt1"/>
+              </a:fontRef>
+            </p:style>
+            <p:txBody>
+              <a:bodyPr rtlCol="0" anchor="ctr"/>
+              <a:lstStyle/>
+              <a:p>
+                <a:pPr algn="ctr"/>
+                <a:endParaRPr lang="en-US" dirty="0"/>
+              </a:p>
+            </p:txBody>
+          </p:sp>
+          <p:sp>
+            <p:nvSpPr>
+              <p:cNvPr id="62" name="Oval 61">
+                <a:extLst>
+                  <a:ext uri="{FF2B5EF4-FFF2-40B4-BE49-F238E27FC236}">
+                    <a16:creationId xmlns:a16="http://schemas.microsoft.com/office/drawing/2014/main" id="{4BE7C8D1-0982-52FB-47CF-CC3724FC0054}"/>
+                  </a:ext>
+                </a:extLst>
+              </p:cNvPr>
+              <p:cNvSpPr>
+                <a:spLocks noChangeAspect="1"/>
+              </p:cNvSpPr>
+              <p:nvPr/>
+            </p:nvSpPr>
+            <p:spPr>
+              <a:xfrm>
+                <a:off x="7670711" y="4126480"/>
+                <a:ext cx="1584000" cy="1584000"/>
+              </a:xfrm>
+              <a:prstGeom prst="ellipse">
+                <a:avLst/>
+              </a:prstGeom>
+              <a:grpFill/>
+              <a:ln>
+                <a:noFill/>
+              </a:ln>
+            </p:spPr>
+            <p:style>
+              <a:lnRef idx="2">
+                <a:schemeClr val="accent1">
+                  <a:shade val="15000"/>
+                </a:schemeClr>
+              </a:lnRef>
+              <a:fillRef idx="1">
+                <a:schemeClr val="accent1"/>
+              </a:fillRef>
+              <a:effectRef idx="0">
+                <a:schemeClr val="accent1"/>
+              </a:effectRef>
+              <a:fontRef idx="minor">
+                <a:schemeClr val="lt1"/>
+              </a:fontRef>
+            </p:style>
+            <p:txBody>
+              <a:bodyPr rtlCol="0" anchor="ctr"/>
+              <a:lstStyle/>
+              <a:p>
+                <a:pPr algn="ctr"/>
+                <a:endParaRPr lang="en-US"/>
+              </a:p>
+            </p:txBody>
+          </p:sp>
+          <p:sp>
+            <p:nvSpPr>
+              <p:cNvPr id="63" name="Oval 62">
+                <a:extLst>
+                  <a:ext uri="{FF2B5EF4-FFF2-40B4-BE49-F238E27FC236}">
+                    <a16:creationId xmlns:a16="http://schemas.microsoft.com/office/drawing/2014/main" id="{7BDA8AAA-4EED-E555-D82E-7BC403EDABD4}"/>
+                  </a:ext>
+                </a:extLst>
+              </p:cNvPr>
+              <p:cNvSpPr>
+                <a:spLocks noChangeAspect="1"/>
+              </p:cNvSpPr>
+              <p:nvPr/>
+            </p:nvSpPr>
+            <p:spPr>
+              <a:xfrm>
+                <a:off x="10048949" y="4126480"/>
+                <a:ext cx="1584000" cy="1584000"/>
+              </a:xfrm>
+              <a:prstGeom prst="ellipse">
+                <a:avLst/>
+              </a:prstGeom>
+              <a:grpFill/>
+              <a:ln>
+                <a:noFill/>
+              </a:ln>
+            </p:spPr>
+            <p:style>
+              <a:lnRef idx="2">
+                <a:schemeClr val="accent1">
+                  <a:shade val="15000"/>
+                </a:schemeClr>
+              </a:lnRef>
+              <a:fillRef idx="1">
+                <a:schemeClr val="accent1"/>
+              </a:fillRef>
+              <a:effectRef idx="0">
+                <a:schemeClr val="accent1"/>
+              </a:effectRef>
+              <a:fontRef idx="minor">
+                <a:schemeClr val="lt1"/>
+              </a:fontRef>
+            </p:style>
+            <p:txBody>
+              <a:bodyPr rtlCol="0" anchor="ctr"/>
+              <a:lstStyle/>
+              <a:p>
+                <a:pPr algn="ctr"/>
+                <a:endParaRPr lang="en-US"/>
+              </a:p>
+            </p:txBody>
+          </p:sp>
+        </p:grpSp>
+        <p:pic>
+          <p:nvPicPr>
+            <p:cNvPr id="8" name="Graphic 7" descr="Earth globe: Americas with solid fill">
+              <a:extLst>
+                <a:ext uri="{FF2B5EF4-FFF2-40B4-BE49-F238E27FC236}">
+                  <a16:creationId xmlns:a16="http://schemas.microsoft.com/office/drawing/2014/main" id="{3269944C-B78D-7600-27E8-EBACD8BCB4CD}"/>
+                </a:ext>
+              </a:extLst>
+            </p:cNvPr>
+            <p:cNvPicPr>
+              <a:picLocks noChangeAspect="1"/>
+            </p:cNvPicPr>
+            <p:nvPr/>
+          </p:nvPicPr>
+          <p:blipFill>
+            <a:blip r:embed="rId2">
+              <a:extLst>
+                <a:ext uri="{96DAC541-7B7A-43D3-8B79-37D633B846F1}">
+                  <asvg:svgBlip xmlns:asvg="http://schemas.microsoft.com/office/drawing/2016/SVG/main" r:embed="rId3"/>
+                </a:ext>
+              </a:extLst>
+            </a:blip>
+            <a:stretch>
+              <a:fillRect/>
+            </a:stretch>
+          </p:blipFill>
+          <p:spPr>
+            <a:xfrm>
+              <a:off x="5089152" y="3138868"/>
+              <a:ext cx="1980000" cy="1980000"/>
+            </a:xfrm>
+            <a:prstGeom prst="rect">
+              <a:avLst/>
+            </a:prstGeom>
+          </p:spPr>
+        </p:pic>
+        <p:sp>
+          <p:nvSpPr>
+            <p:cNvPr id="4" name="Rounded Rectangle 3">
+              <a:extLst>
+                <a:ext uri="{FF2B5EF4-FFF2-40B4-BE49-F238E27FC236}">
+                  <a16:creationId xmlns:a16="http://schemas.microsoft.com/office/drawing/2014/main" id="{9259966F-6E31-7D91-F917-71B3D8DF14AD}"/>
+                </a:ext>
+              </a:extLst>
+            </p:cNvPr>
+            <p:cNvSpPr/>
+            <p:nvPr/>
+          </p:nvSpPr>
+          <p:spPr>
+            <a:xfrm>
+              <a:off x="3745706" y="304841"/>
+              <a:ext cx="4700588" cy="1328738"/>
+            </a:xfrm>
+            <a:prstGeom prst="roundRect">
+              <a:avLst/>
+            </a:prstGeom>
+            <a:solidFill>
+              <a:srgbClr val="2AA0D6"/>
+            </a:solidFill>
             <a:ln>
               <a:noFill/>
             </a:ln>
@@ -3426,35 +4181,375 @@
             <a:lstStyle/>
             <a:p>
               <a:pPr algn="ctr"/>
-              <a:endParaRPr lang="en-US"/>
+              <a:r>
+                <a:rPr lang="en-US" sz="2400" dirty="0">
+                  <a:latin typeface="Segoe UI" panose="020F0502020204030204" pitchFamily="34" charset="0"/>
+                  <a:cs typeface="Segoe UI" panose="020F0502020204030204" pitchFamily="34" charset="0"/>
+                </a:rPr>
+                <a:t>Space Exploration in Time Series</a:t>
+              </a:r>
             </a:p>
           </p:txBody>
         </p:sp>
-        <p:sp>
-          <p:nvSpPr>
-            <p:cNvPr id="60" name="Oval 59">
+        <p:pic>
+          <p:nvPicPr>
+            <p:cNvPr id="10" name="Graphic 9" descr="Mercury with solid fill">
               <a:extLst>
                 <a:ext uri="{FF2B5EF4-FFF2-40B4-BE49-F238E27FC236}">
-                  <a16:creationId xmlns:a16="http://schemas.microsoft.com/office/drawing/2014/main" id="{640B2652-D139-F524-EEFD-D72A2025C914}"/>
+                  <a16:creationId xmlns:a16="http://schemas.microsoft.com/office/drawing/2014/main" id="{39CB9F07-E457-670A-8BCF-ECFC33D88231}"/>
                 </a:ext>
               </a:extLst>
             </p:cNvPr>
-            <p:cNvSpPr>
-              <a:spLocks noChangeAspect="1"/>
-            </p:cNvSpPr>
+            <p:cNvPicPr>
+              <a:picLocks noChangeAspect="1"/>
+            </p:cNvPicPr>
+            <p:nvPr/>
+          </p:nvPicPr>
+          <p:blipFill>
+            <a:blip r:embed="rId4">
+              <a:extLst>
+                <a:ext uri="{96DAC541-7B7A-43D3-8B79-37D633B846F1}">
+                  <asvg:svgBlip xmlns:asvg="http://schemas.microsoft.com/office/drawing/2016/SVG/main" r:embed="rId5"/>
+                </a:ext>
+              </a:extLst>
+            </a:blip>
+            <a:stretch>
+              <a:fillRect/>
+            </a:stretch>
+          </p:blipFill>
+          <p:spPr>
+            <a:xfrm>
+              <a:off x="252762" y="3084004"/>
+              <a:ext cx="2160000" cy="2160000"/>
+            </a:xfrm>
+            <a:prstGeom prst="rect">
+              <a:avLst/>
+            </a:prstGeom>
+          </p:spPr>
+        </p:pic>
+        <p:pic>
+          <p:nvPicPr>
+            <p:cNvPr id="14" name="Graphic 13" descr="Venus with solid fill">
+              <a:extLst>
+                <a:ext uri="{FF2B5EF4-FFF2-40B4-BE49-F238E27FC236}">
+                  <a16:creationId xmlns:a16="http://schemas.microsoft.com/office/drawing/2014/main" id="{C9C13A1D-38BD-F694-AC8A-AD1FF0E52042}"/>
+                </a:ext>
+              </a:extLst>
+            </p:cNvPr>
+            <p:cNvPicPr>
+              <a:picLocks noChangeAspect="1"/>
+            </p:cNvPicPr>
+            <p:nvPr/>
+          </p:nvPicPr>
+          <p:blipFill>
+            <a:blip r:embed="rId6">
+              <a:extLst>
+                <a:ext uri="{96DAC541-7B7A-43D3-8B79-37D633B846F1}">
+                  <asvg:svgBlip xmlns:asvg="http://schemas.microsoft.com/office/drawing/2016/SVG/main" r:embed="rId7"/>
+                </a:ext>
+              </a:extLst>
+            </a:blip>
+            <a:stretch>
+              <a:fillRect/>
+            </a:stretch>
+          </p:blipFill>
+          <p:spPr>
+            <a:xfrm>
+              <a:off x="2636012" y="3084004"/>
+              <a:ext cx="2160000" cy="2160000"/>
+            </a:xfrm>
+            <a:prstGeom prst="rect">
+              <a:avLst/>
+            </a:prstGeom>
+          </p:spPr>
+        </p:pic>
+        <p:pic>
+          <p:nvPicPr>
+            <p:cNvPr id="18" name="Graphic 17" descr="Mars with solid fill">
+              <a:extLst>
+                <a:ext uri="{FF2B5EF4-FFF2-40B4-BE49-F238E27FC236}">
+                  <a16:creationId xmlns:a16="http://schemas.microsoft.com/office/drawing/2014/main" id="{5BEC2E3B-3576-ECA8-CC4E-C0570A9799A9}"/>
+                </a:ext>
+              </a:extLst>
+            </p:cNvPr>
+            <p:cNvPicPr>
+              <a:picLocks noChangeAspect="1"/>
+            </p:cNvPicPr>
+            <p:nvPr/>
+          </p:nvPicPr>
+          <p:blipFill>
+            <a:blip r:embed="rId8">
+              <a:extLst>
+                <a:ext uri="{96DAC541-7B7A-43D3-8B79-37D633B846F1}">
+                  <asvg:svgBlip xmlns:asvg="http://schemas.microsoft.com/office/drawing/2016/SVG/main" r:embed="rId9"/>
+                </a:ext>
+              </a:extLst>
+            </a:blip>
+            <a:stretch>
+              <a:fillRect/>
+            </a:stretch>
+          </p:blipFill>
+          <p:spPr>
+            <a:xfrm>
+              <a:off x="7392378" y="3084004"/>
+              <a:ext cx="2160000" cy="2160000"/>
+            </a:xfrm>
+            <a:prstGeom prst="rect">
+              <a:avLst/>
+            </a:prstGeom>
+          </p:spPr>
+        </p:pic>
+        <p:pic>
+          <p:nvPicPr>
+            <p:cNvPr id="22" name="Graphic 21" descr="Jupiter with solid fill">
+              <a:extLst>
+                <a:ext uri="{FF2B5EF4-FFF2-40B4-BE49-F238E27FC236}">
+                  <a16:creationId xmlns:a16="http://schemas.microsoft.com/office/drawing/2014/main" id="{AB148851-8344-228E-2DF0-B2EC44E12451}"/>
+                </a:ext>
+              </a:extLst>
+            </p:cNvPr>
+            <p:cNvPicPr>
+              <a:picLocks noChangeAspect="1"/>
+            </p:cNvPicPr>
+            <p:nvPr/>
+          </p:nvPicPr>
+          <p:blipFill>
+            <a:blip r:embed="rId10">
+              <a:extLst>
+                <a:ext uri="{96DAC541-7B7A-43D3-8B79-37D633B846F1}">
+                  <asvg:svgBlip xmlns:asvg="http://schemas.microsoft.com/office/drawing/2016/SVG/main" r:embed="rId11"/>
+                </a:ext>
+              </a:extLst>
+            </a:blip>
+            <a:stretch>
+              <a:fillRect/>
+            </a:stretch>
+          </p:blipFill>
+          <p:spPr>
+            <a:xfrm>
+              <a:off x="9760950" y="3084004"/>
+              <a:ext cx="2160000" cy="2160000"/>
+            </a:xfrm>
+            <a:prstGeom prst="rect">
+              <a:avLst/>
+            </a:prstGeom>
+          </p:spPr>
+        </p:pic>
+        <p:cxnSp>
+          <p:nvCxnSpPr>
+            <p:cNvPr id="27" name="Elbow Connector 26">
+              <a:extLst>
+                <a:ext uri="{FF2B5EF4-FFF2-40B4-BE49-F238E27FC236}">
+                  <a16:creationId xmlns:a16="http://schemas.microsoft.com/office/drawing/2014/main" id="{9E245B75-CE2C-8E67-09EE-F0B4E9364A60}"/>
+                </a:ext>
+              </a:extLst>
+            </p:cNvPr>
+            <p:cNvCxnSpPr>
+              <a:cxnSpLocks/>
+              <a:stCxn id="4" idx="2"/>
+              <a:endCxn id="57" idx="0"/>
+            </p:cNvCxnSpPr>
+            <p:nvPr/>
+          </p:nvCxnSpPr>
+          <p:spPr>
+            <a:xfrm rot="5400000">
+              <a:off x="2840451" y="121122"/>
+              <a:ext cx="1743093" cy="4768006"/>
+            </a:xfrm>
+            <a:prstGeom prst="bentConnector3">
+              <a:avLst>
+                <a:gd name="adj1" fmla="val 50000"/>
+              </a:avLst>
+            </a:prstGeom>
+            <a:ln w="63500">
+              <a:solidFill>
+                <a:srgbClr val="2AA0D6"/>
+              </a:solidFill>
+              <a:tailEnd type="triangle"/>
+            </a:ln>
+          </p:spPr>
+          <p:style>
+            <a:lnRef idx="1">
+              <a:schemeClr val="accent1"/>
+            </a:lnRef>
+            <a:fillRef idx="0">
+              <a:schemeClr val="accent1"/>
+            </a:fillRef>
+            <a:effectRef idx="0">
+              <a:schemeClr val="accent1"/>
+            </a:effectRef>
+            <a:fontRef idx="minor">
+              <a:schemeClr val="tx1"/>
+            </a:fontRef>
+          </p:style>
+        </p:cxnSp>
+        <p:cxnSp>
+          <p:nvCxnSpPr>
+            <p:cNvPr id="33" name="Elbow Connector 32">
+              <a:extLst>
+                <a:ext uri="{FF2B5EF4-FFF2-40B4-BE49-F238E27FC236}">
+                  <a16:creationId xmlns:a16="http://schemas.microsoft.com/office/drawing/2014/main" id="{45DC433E-AFA1-DC52-7862-4BD8592C8372}"/>
+                </a:ext>
+              </a:extLst>
+            </p:cNvPr>
+            <p:cNvCxnSpPr>
+              <a:cxnSpLocks/>
+              <a:stCxn id="4" idx="2"/>
+              <a:endCxn id="62" idx="0"/>
+            </p:cNvCxnSpPr>
+            <p:nvPr/>
+          </p:nvCxnSpPr>
+          <p:spPr>
+            <a:xfrm rot="16200000" flipH="1">
+              <a:off x="6407809" y="1321769"/>
+              <a:ext cx="1743093" cy="2366711"/>
+            </a:xfrm>
+            <a:prstGeom prst="bentConnector3">
+              <a:avLst/>
+            </a:prstGeom>
+            <a:ln w="63500">
+              <a:solidFill>
+                <a:srgbClr val="2AA0D6"/>
+              </a:solidFill>
+              <a:tailEnd type="triangle"/>
+            </a:ln>
+          </p:spPr>
+          <p:style>
+            <a:lnRef idx="1">
+              <a:schemeClr val="accent1"/>
+            </a:lnRef>
+            <a:fillRef idx="0">
+              <a:schemeClr val="accent1"/>
+            </a:fillRef>
+            <a:effectRef idx="0">
+              <a:schemeClr val="accent1"/>
+            </a:effectRef>
+            <a:fontRef idx="minor">
+              <a:schemeClr val="tx1"/>
+            </a:fontRef>
+          </p:style>
+        </p:cxnSp>
+        <p:cxnSp>
+          <p:nvCxnSpPr>
+            <p:cNvPr id="38" name="Straight Arrow Connector 37">
+              <a:extLst>
+                <a:ext uri="{FF2B5EF4-FFF2-40B4-BE49-F238E27FC236}">
+                  <a16:creationId xmlns:a16="http://schemas.microsoft.com/office/drawing/2014/main" id="{07410A4A-0EA4-34CA-5B98-B26FAF0C5B46}"/>
+                </a:ext>
+              </a:extLst>
+            </p:cNvPr>
+            <p:cNvCxnSpPr>
+              <a:cxnSpLocks/>
+              <a:stCxn id="4" idx="2"/>
+              <a:endCxn id="61" idx="0"/>
+            </p:cNvCxnSpPr>
+            <p:nvPr/>
+          </p:nvCxnSpPr>
+          <p:spPr>
+            <a:xfrm flipH="1">
+              <a:off x="6084472" y="1633579"/>
+              <a:ext cx="11528" cy="1688552"/>
+            </a:xfrm>
+            <a:prstGeom prst="straightConnector1">
+              <a:avLst/>
+            </a:prstGeom>
+            <a:ln w="63500">
+              <a:solidFill>
+                <a:srgbClr val="2AA0D6"/>
+              </a:solidFill>
+              <a:tailEnd type="triangle"/>
+            </a:ln>
+          </p:spPr>
+          <p:style>
+            <a:lnRef idx="1">
+              <a:schemeClr val="accent1"/>
+            </a:lnRef>
+            <a:fillRef idx="0">
+              <a:schemeClr val="accent1"/>
+            </a:fillRef>
+            <a:effectRef idx="0">
+              <a:schemeClr val="accent1"/>
+            </a:effectRef>
+            <a:fontRef idx="minor">
+              <a:schemeClr val="tx1"/>
+            </a:fontRef>
+          </p:style>
+        </p:cxnSp>
+        <p:cxnSp>
+          <p:nvCxnSpPr>
+            <p:cNvPr id="40" name="Elbow Connector 39">
+              <a:extLst>
+                <a:ext uri="{FF2B5EF4-FFF2-40B4-BE49-F238E27FC236}">
+                  <a16:creationId xmlns:a16="http://schemas.microsoft.com/office/drawing/2014/main" id="{CEC137CD-431C-E8FD-00A9-DA76AB41668B}"/>
+                </a:ext>
+              </a:extLst>
+            </p:cNvPr>
+            <p:cNvCxnSpPr>
+              <a:cxnSpLocks/>
+              <a:stCxn id="4" idx="2"/>
+              <a:endCxn id="60" idx="0"/>
+            </p:cNvCxnSpPr>
+            <p:nvPr/>
+          </p:nvCxnSpPr>
+          <p:spPr>
+            <a:xfrm rot="5400000">
+              <a:off x="4029571" y="1310242"/>
+              <a:ext cx="1743093" cy="2389767"/>
+            </a:xfrm>
+            <a:prstGeom prst="bentConnector3">
+              <a:avLst>
+                <a:gd name="adj1" fmla="val 50000"/>
+              </a:avLst>
+            </a:prstGeom>
+            <a:ln w="63500">
+              <a:solidFill>
+                <a:srgbClr val="2AA0D6"/>
+              </a:solidFill>
+              <a:tailEnd type="triangle"/>
+            </a:ln>
+          </p:spPr>
+          <p:style>
+            <a:lnRef idx="1">
+              <a:schemeClr val="accent1"/>
+            </a:lnRef>
+            <a:fillRef idx="0">
+              <a:schemeClr val="accent1"/>
+            </a:fillRef>
+            <a:effectRef idx="0">
+              <a:schemeClr val="accent1"/>
+            </a:effectRef>
+            <a:fontRef idx="minor">
+              <a:schemeClr val="tx1"/>
+            </a:fontRef>
+          </p:style>
+        </p:cxnSp>
+        <p:sp>
+          <p:nvSpPr>
+            <p:cNvPr id="46" name="Rectangle 45">
+              <a:extLst>
+                <a:ext uri="{FF2B5EF4-FFF2-40B4-BE49-F238E27FC236}">
+                  <a16:creationId xmlns:a16="http://schemas.microsoft.com/office/drawing/2014/main" id="{CDA432F8-094C-F07C-F214-26F585D938DC}"/>
+                </a:ext>
+              </a:extLst>
+            </p:cNvPr>
+            <p:cNvSpPr/>
             <p:nvPr/>
           </p:nvSpPr>
           <p:spPr>
             <a:xfrm>
-              <a:off x="2914233" y="4126480"/>
-              <a:ext cx="1584000" cy="1584000"/>
+              <a:off x="252762" y="4723350"/>
+              <a:ext cx="2160000" cy="1471388"/>
             </a:xfrm>
-            <a:prstGeom prst="ellipse">
+            <a:prstGeom prst="rect">
               <a:avLst/>
             </a:prstGeom>
-            <a:grpFill/>
+            <a:solidFill>
+              <a:schemeClr val="bg1"/>
+            </a:solidFill>
             <a:ln>
-              <a:noFill/>
+              <a:solidFill>
+                <a:srgbClr val="2AA0D6"/>
+              </a:solidFill>
             </a:ln>
           </p:spPr>
           <p:style>
@@ -3474,39 +4569,98 @@
             </a:fontRef>
           </p:style>
           <p:txBody>
-            <a:bodyPr rtlCol="0" anchor="ctr"/>
+            <a:bodyPr lIns="90000" rtlCol="0" anchor="t"/>
             <a:lstStyle/>
             <a:p>
               <a:pPr algn="ctr"/>
-              <a:endParaRPr lang="en-US" dirty="0"/>
+              <a:r>
+                <a:rPr lang="en-US" sz="1600" dirty="0">
+                  <a:solidFill>
+                    <a:srgbClr val="2AA0D6"/>
+                  </a:solidFill>
+                  <a:latin typeface="Segoe UI" panose="020B0502040204020203" pitchFamily="34" charset="0"/>
+                  <a:cs typeface="Segoe UI" panose="020B0502040204020203" pitchFamily="34" charset="0"/>
+                </a:rPr>
+                <a:t>The Public Sector</a:t>
+              </a:r>
+              <a:endParaRPr lang="en-US" sz="1200" dirty="0">
+                <a:solidFill>
+                  <a:srgbClr val="2AA0D6"/>
+                </a:solidFill>
+                <a:latin typeface="Segoe UI" panose="020B0502040204020203" pitchFamily="34" charset="0"/>
+                <a:cs typeface="Segoe UI" panose="020B0502040204020203" pitchFamily="34" charset="0"/>
+              </a:endParaRPr>
+            </a:p>
+            <a:p>
+              <a:endParaRPr lang="en-US" sz="1200" dirty="0">
+                <a:solidFill>
+                  <a:srgbClr val="2AA0D6"/>
+                </a:solidFill>
+                <a:latin typeface="Segoe UI" panose="020B0502040204020203" pitchFamily="34" charset="0"/>
+                <a:cs typeface="Segoe UI" panose="020B0502040204020203" pitchFamily="34" charset="0"/>
+              </a:endParaRPr>
+            </a:p>
+            <a:p>
+              <a:pPr marL="171450" indent="-171450">
+                <a:buFont typeface="Arial" panose="020B0604020202020204" pitchFamily="34" charset="0"/>
+                <a:buChar char="•"/>
+              </a:pPr>
+              <a:r>
+                <a:rPr lang="en-US" sz="1200" dirty="0">
+                  <a:solidFill>
+                    <a:srgbClr val="2AA0D6"/>
+                  </a:solidFill>
+                  <a:latin typeface="Segoe UI" panose="020B0502040204020203" pitchFamily="34" charset="0"/>
+                  <a:cs typeface="Segoe UI" panose="020B0502040204020203" pitchFamily="34" charset="0"/>
+                </a:rPr>
+                <a:t>Changes in government space expenditure</a:t>
+              </a:r>
+            </a:p>
+            <a:p>
+              <a:pPr marL="171450" indent="-171450">
+                <a:buFont typeface="Arial" panose="020B0604020202020204" pitchFamily="34" charset="0"/>
+                <a:buChar char="•"/>
+              </a:pPr>
+              <a:r>
+                <a:rPr lang="en-US" sz="1200" dirty="0">
+                  <a:solidFill>
+                    <a:srgbClr val="2AA0D6"/>
+                  </a:solidFill>
+                  <a:latin typeface="Segoe UI" panose="020B0502040204020203" pitchFamily="34" charset="0"/>
+                  <a:cs typeface="Segoe UI" panose="020B0502040204020203" pitchFamily="34" charset="0"/>
+                </a:rPr>
+                <a:t>Trends in weather patterns in mars from the NASA Curiosity mission.</a:t>
+              </a:r>
             </a:p>
           </p:txBody>
         </p:sp>
         <p:sp>
           <p:nvSpPr>
-            <p:cNvPr id="61" name="Oval 60">
+            <p:cNvPr id="47" name="Rectangle 46">
               <a:extLst>
                 <a:ext uri="{FF2B5EF4-FFF2-40B4-BE49-F238E27FC236}">
-                  <a16:creationId xmlns:a16="http://schemas.microsoft.com/office/drawing/2014/main" id="{3B223EDB-6A4A-0066-94EC-4F6D2BA7F39C}"/>
+                  <a16:creationId xmlns:a16="http://schemas.microsoft.com/office/drawing/2014/main" id="{D7CC336E-60AD-60E9-195E-87D5A9A3EB26}"/>
                 </a:ext>
               </a:extLst>
             </p:cNvPr>
-            <p:cNvSpPr>
-              <a:spLocks noChangeAspect="1"/>
-            </p:cNvSpPr>
+            <p:cNvSpPr/>
             <p:nvPr/>
           </p:nvSpPr>
           <p:spPr>
             <a:xfrm>
-              <a:off x="5292472" y="4071939"/>
-              <a:ext cx="1584000" cy="1584000"/>
+              <a:off x="2621334" y="4723351"/>
+              <a:ext cx="2160000" cy="1471388"/>
             </a:xfrm>
-            <a:prstGeom prst="ellipse">
+            <a:prstGeom prst="rect">
               <a:avLst/>
             </a:prstGeom>
-            <a:grpFill/>
+            <a:solidFill>
+              <a:schemeClr val="bg1"/>
+            </a:solidFill>
             <a:ln>
-              <a:noFill/>
+              <a:solidFill>
+                <a:srgbClr val="2AA0D6"/>
+              </a:solidFill>
             </a:ln>
           </p:spPr>
           <p:style>
@@ -3526,39 +4680,127 @@
             </a:fontRef>
           </p:style>
           <p:txBody>
-            <a:bodyPr rtlCol="0" anchor="ctr"/>
+            <a:bodyPr rtlCol="0" anchor="t"/>
             <a:lstStyle/>
             <a:p>
               <a:pPr algn="ctr"/>
-              <a:endParaRPr lang="en-US" dirty="0"/>
+              <a:r>
+                <a:rPr lang="en-US" sz="1600" dirty="0">
+                  <a:solidFill>
+                    <a:srgbClr val="2AA0D6"/>
+                  </a:solidFill>
+                  <a:latin typeface="Segoe UI" panose="020B0502040204020203" pitchFamily="34" charset="0"/>
+                  <a:cs typeface="Segoe UI" panose="020B0502040204020203" pitchFamily="34" charset="0"/>
+                </a:rPr>
+                <a:t>Public Interest</a:t>
+              </a:r>
+            </a:p>
+            <a:p>
+              <a:pPr marR="0" lvl="0" algn="l" defTabSz="914400" rtl="0" eaLnBrk="1" fontAlgn="auto" latinLnBrk="0" hangingPunct="1">
+                <a:lnSpc>
+                  <a:spcPct val="100000"/>
+                </a:lnSpc>
+                <a:spcBef>
+                  <a:spcPts val="0"/>
+                </a:spcBef>
+                <a:spcAft>
+                  <a:spcPts val="0"/>
+                </a:spcAft>
+                <a:buClrTx/>
+                <a:buSzTx/>
+                <a:tabLst/>
+                <a:defRPr/>
+              </a:pPr>
+              <a:endParaRPr kumimoji="0" lang="en-US" sz="1200" b="0" i="0" u="none" strike="noStrike" kern="1200" cap="none" spc="0" normalizeH="0" baseline="0" noProof="0" dirty="0">
+                <a:ln>
+                  <a:noFill/>
+                </a:ln>
+                <a:solidFill>
+                  <a:srgbClr val="2AA0D6"/>
+                </a:solidFill>
+                <a:effectLst/>
+                <a:uLnTx/>
+                <a:uFillTx/>
+                <a:latin typeface="Segoe UI" panose="020B0502040204020203" pitchFamily="34" charset="0"/>
+                <a:ea typeface="+mn-ea"/>
+                <a:cs typeface="Segoe UI" panose="020B0502040204020203" pitchFamily="34" charset="0"/>
+              </a:endParaRPr>
+            </a:p>
+            <a:p>
+              <a:pPr marL="171450" marR="0" lvl="0" indent="-171450" algn="l" defTabSz="914400" rtl="0" eaLnBrk="1" fontAlgn="auto" latinLnBrk="0" hangingPunct="1">
+                <a:lnSpc>
+                  <a:spcPct val="100000"/>
+                </a:lnSpc>
+                <a:spcBef>
+                  <a:spcPts val="0"/>
+                </a:spcBef>
+                <a:spcAft>
+                  <a:spcPts val="0"/>
+                </a:spcAft>
+                <a:buClrTx/>
+                <a:buSzTx/>
+                <a:buFont typeface="Arial" panose="020B0604020202020204" pitchFamily="34" charset="0"/>
+                <a:buChar char="•"/>
+                <a:tabLst/>
+                <a:defRPr/>
+              </a:pPr>
+              <a:r>
+                <a:rPr kumimoji="0" lang="en-US" sz="1200" b="0" i="0" u="none" strike="noStrike" kern="1200" cap="none" spc="0" normalizeH="0" baseline="0" noProof="0" dirty="0">
+                  <a:ln>
+                    <a:noFill/>
+                  </a:ln>
+                  <a:solidFill>
+                    <a:srgbClr val="2AA0D6"/>
+                  </a:solidFill>
+                  <a:effectLst/>
+                  <a:uLnTx/>
+                  <a:uFillTx/>
+                  <a:latin typeface="Segoe UI" panose="020B0502040204020203" pitchFamily="34" charset="0"/>
+                  <a:ea typeface="+mn-ea"/>
+                  <a:cs typeface="Segoe UI" panose="020B0502040204020203" pitchFamily="34" charset="0"/>
+                </a:rPr>
+                <a:t>Patterns in space-related Google trend data.</a:t>
+              </a:r>
+            </a:p>
+            <a:p>
+              <a:pPr algn="ctr"/>
+              <a:endParaRPr lang="en-US" sz="1600" dirty="0">
+                <a:solidFill>
+                  <a:srgbClr val="2AA0D6"/>
+                </a:solidFill>
+                <a:latin typeface="Segoe UI" panose="020B0502040204020203" pitchFamily="34" charset="0"/>
+                <a:cs typeface="Segoe UI" panose="020B0502040204020203" pitchFamily="34" charset="0"/>
+              </a:endParaRPr>
             </a:p>
           </p:txBody>
         </p:sp>
         <p:sp>
           <p:nvSpPr>
-            <p:cNvPr id="62" name="Oval 61">
+            <p:cNvPr id="48" name="Rectangle 47">
               <a:extLst>
                 <a:ext uri="{FF2B5EF4-FFF2-40B4-BE49-F238E27FC236}">
-                  <a16:creationId xmlns:a16="http://schemas.microsoft.com/office/drawing/2014/main" id="{4BE7C8D1-0982-52FB-47CF-CC3724FC0054}"/>
+                  <a16:creationId xmlns:a16="http://schemas.microsoft.com/office/drawing/2014/main" id="{87A54DA6-4E13-5387-15D9-3E705B2C2100}"/>
                 </a:ext>
               </a:extLst>
             </p:cNvPr>
-            <p:cNvSpPr>
-              <a:spLocks noChangeAspect="1"/>
-            </p:cNvSpPr>
+            <p:cNvSpPr/>
             <p:nvPr/>
           </p:nvSpPr>
           <p:spPr>
             <a:xfrm>
-              <a:off x="7670711" y="4126480"/>
-              <a:ext cx="1584000" cy="1584000"/>
+              <a:off x="4997711" y="4723351"/>
+              <a:ext cx="2160000" cy="1471387"/>
             </a:xfrm>
-            <a:prstGeom prst="ellipse">
+            <a:prstGeom prst="rect">
               <a:avLst/>
             </a:prstGeom>
-            <a:grpFill/>
+            <a:solidFill>
+              <a:schemeClr val="bg1"/>
+            </a:solidFill>
             <a:ln>
-              <a:noFill/>
+              <a:solidFill>
+                <a:srgbClr val="2AA0D6"/>
+              </a:solidFill>
             </a:ln>
           </p:spPr>
           <p:style>
@@ -3578,39 +4820,170 @@
             </a:fontRef>
           </p:style>
           <p:txBody>
-            <a:bodyPr rtlCol="0" anchor="ctr"/>
+            <a:bodyPr rtlCol="0" anchor="t"/>
             <a:lstStyle/>
             <a:p>
               <a:pPr algn="ctr"/>
-              <a:endParaRPr lang="en-US"/>
+              <a:r>
+                <a:rPr lang="en-US" sz="1600" dirty="0">
+                  <a:solidFill>
+                    <a:srgbClr val="2AA0D6"/>
+                  </a:solidFill>
+                  <a:latin typeface="Segoe UI" panose="020B0502040204020203" pitchFamily="34" charset="0"/>
+                  <a:cs typeface="Segoe UI" panose="020B0502040204020203" pitchFamily="34" charset="0"/>
+                </a:rPr>
+                <a:t>Space Infrastructure</a:t>
+              </a:r>
+            </a:p>
+            <a:p>
+              <a:pPr marR="0" lvl="0" algn="l" defTabSz="914400" rtl="0" eaLnBrk="1" fontAlgn="auto" latinLnBrk="0" hangingPunct="1">
+                <a:lnSpc>
+                  <a:spcPct val="100000"/>
+                </a:lnSpc>
+                <a:spcBef>
+                  <a:spcPts val="0"/>
+                </a:spcBef>
+                <a:spcAft>
+                  <a:spcPts val="0"/>
+                </a:spcAft>
+                <a:buClrTx/>
+                <a:buSzTx/>
+                <a:tabLst/>
+                <a:defRPr/>
+              </a:pPr>
+              <a:endParaRPr kumimoji="0" lang="en-US" sz="1200" b="0" i="0" u="none" strike="noStrike" kern="1200" cap="none" spc="0" normalizeH="0" baseline="0" noProof="0" dirty="0">
+                <a:ln>
+                  <a:noFill/>
+                </a:ln>
+                <a:solidFill>
+                  <a:srgbClr val="2AA0D6"/>
+                </a:solidFill>
+                <a:effectLst/>
+                <a:uLnTx/>
+                <a:uFillTx/>
+                <a:latin typeface="Segoe UI" panose="020B0502040204020203" pitchFamily="34" charset="0"/>
+                <a:ea typeface="+mn-ea"/>
+                <a:cs typeface="Segoe UI" panose="020B0502040204020203" pitchFamily="34" charset="0"/>
+              </a:endParaRPr>
+            </a:p>
+            <a:p>
+              <a:pPr marL="171450" marR="0" lvl="0" indent="-171450" algn="l" defTabSz="914400" rtl="0" eaLnBrk="1" fontAlgn="auto" latinLnBrk="0" hangingPunct="1">
+                <a:lnSpc>
+                  <a:spcPct val="100000"/>
+                </a:lnSpc>
+                <a:spcBef>
+                  <a:spcPts val="0"/>
+                </a:spcBef>
+                <a:spcAft>
+                  <a:spcPts val="0"/>
+                </a:spcAft>
+                <a:buClrTx/>
+                <a:buSzTx/>
+                <a:buFont typeface="Arial" panose="020B0604020202020204" pitchFamily="34" charset="0"/>
+                <a:buChar char="•"/>
+                <a:tabLst/>
+                <a:defRPr/>
+              </a:pPr>
+              <a:r>
+                <a:rPr kumimoji="0" lang="en-US" sz="1200" b="0" i="0" u="none" strike="noStrike" kern="1200" cap="none" spc="0" normalizeH="0" baseline="0" noProof="0" dirty="0">
+                  <a:ln>
+                    <a:noFill/>
+                  </a:ln>
+                  <a:solidFill>
+                    <a:srgbClr val="2AA0D6"/>
+                  </a:solidFill>
+                  <a:effectLst/>
+                  <a:uLnTx/>
+                  <a:uFillTx/>
+                  <a:latin typeface="Segoe UI" panose="020B0502040204020203" pitchFamily="34" charset="0"/>
+                  <a:ea typeface="+mn-ea"/>
+                  <a:cs typeface="Segoe UI" panose="020B0502040204020203" pitchFamily="34" charset="0"/>
+                </a:rPr>
+                <a:t>Trends in historical weather satellite launches.</a:t>
+              </a:r>
+            </a:p>
+            <a:p>
+              <a:pPr marL="171450" marR="0" lvl="0" indent="-171450" algn="l" defTabSz="914400" rtl="0" eaLnBrk="1" fontAlgn="auto" latinLnBrk="0" hangingPunct="1">
+                <a:lnSpc>
+                  <a:spcPct val="100000"/>
+                </a:lnSpc>
+                <a:spcBef>
+                  <a:spcPts val="0"/>
+                </a:spcBef>
+                <a:spcAft>
+                  <a:spcPts val="0"/>
+                </a:spcAft>
+                <a:buClrTx/>
+                <a:buSzTx/>
+                <a:buFont typeface="Arial" panose="020B0604020202020204" pitchFamily="34" charset="0"/>
+                <a:buChar char="•"/>
+                <a:tabLst/>
+                <a:defRPr/>
+              </a:pPr>
+              <a:r>
+                <a:rPr lang="en-US" sz="1200" dirty="0">
+                  <a:solidFill>
+                    <a:srgbClr val="2AA0D6"/>
+                  </a:solidFill>
+                  <a:latin typeface="Segoe UI" panose="020B0502040204020203" pitchFamily="34" charset="0"/>
+                  <a:cs typeface="Segoe UI" panose="020B0502040204020203" pitchFamily="34" charset="0"/>
+                </a:rPr>
+                <a:t>Changes in the purpose and control of operational satellites.  </a:t>
+              </a:r>
+              <a:endParaRPr kumimoji="0" lang="en-US" sz="1200" b="0" i="0" u="none" strike="noStrike" kern="1200" cap="none" spc="0" normalizeH="0" baseline="0" noProof="0" dirty="0">
+                <a:ln>
+                  <a:noFill/>
+                </a:ln>
+                <a:solidFill>
+                  <a:srgbClr val="2AA0D6"/>
+                </a:solidFill>
+                <a:effectLst/>
+                <a:uLnTx/>
+                <a:uFillTx/>
+                <a:latin typeface="Segoe UI" panose="020B0502040204020203" pitchFamily="34" charset="0"/>
+                <a:ea typeface="+mn-ea"/>
+                <a:cs typeface="Segoe UI" panose="020B0502040204020203" pitchFamily="34" charset="0"/>
+              </a:endParaRPr>
+            </a:p>
+            <a:p>
+              <a:pPr algn="ctr"/>
+              <a:endParaRPr lang="en-US" sz="1600" dirty="0">
+                <a:solidFill>
+                  <a:srgbClr val="2AA0D6"/>
+                </a:solidFill>
+                <a:latin typeface="Segoe UI" panose="020B0502040204020203" pitchFamily="34" charset="0"/>
+                <a:cs typeface="Segoe UI" panose="020B0502040204020203" pitchFamily="34" charset="0"/>
+              </a:endParaRPr>
             </a:p>
           </p:txBody>
         </p:sp>
         <p:sp>
           <p:nvSpPr>
-            <p:cNvPr id="63" name="Oval 62">
+            <p:cNvPr id="49" name="Rectangle 48">
               <a:extLst>
                 <a:ext uri="{FF2B5EF4-FFF2-40B4-BE49-F238E27FC236}">
-                  <a16:creationId xmlns:a16="http://schemas.microsoft.com/office/drawing/2014/main" id="{7BDA8AAA-4EED-E555-D82E-7BC403EDABD4}"/>
+                  <a16:creationId xmlns:a16="http://schemas.microsoft.com/office/drawing/2014/main" id="{403BF609-329D-AEC5-54B3-1C01E33D86AB}"/>
                 </a:ext>
               </a:extLst>
             </p:cNvPr>
-            <p:cNvSpPr>
-              <a:spLocks noChangeAspect="1"/>
-            </p:cNvSpPr>
+            <p:cNvSpPr/>
             <p:nvPr/>
           </p:nvSpPr>
           <p:spPr>
             <a:xfrm>
-              <a:off x="10048949" y="4126480"/>
-              <a:ext cx="1584000" cy="1584000"/>
+              <a:off x="7366283" y="4723350"/>
+              <a:ext cx="2160000" cy="1471387"/>
             </a:xfrm>
-            <a:prstGeom prst="ellipse">
+            <a:prstGeom prst="rect">
               <a:avLst/>
             </a:prstGeom>
-            <a:grpFill/>
+            <a:solidFill>
+              <a:schemeClr val="bg1"/>
+            </a:solidFill>
             <a:ln>
-              <a:noFill/>
+              <a:solidFill>
+                <a:srgbClr val="2AA0D6"/>
+              </a:solidFill>
             </a:ln>
           </p:spPr>
           <p:style>
@@ -3630,794 +5003,327 @@
             </a:fontRef>
           </p:style>
           <p:txBody>
-            <a:bodyPr rtlCol="0" anchor="ctr"/>
+            <a:bodyPr rtlCol="0" anchor="t"/>
             <a:lstStyle/>
             <a:p>
               <a:pPr algn="ctr"/>
-              <a:endParaRPr lang="en-US"/>
+              <a:r>
+                <a:rPr lang="en-US" sz="1600" dirty="0">
+                  <a:solidFill>
+                    <a:srgbClr val="2AA0D6"/>
+                  </a:solidFill>
+                  <a:latin typeface="Segoe UI" panose="020B0502040204020203" pitchFamily="34" charset="0"/>
+                  <a:cs typeface="Segoe UI" panose="020B0502040204020203" pitchFamily="34" charset="0"/>
+                </a:rPr>
+                <a:t>The Private Sector</a:t>
+              </a:r>
+              <a:endParaRPr kumimoji="0" lang="en-US" sz="1200" b="0" i="0" u="none" strike="noStrike" kern="1200" cap="none" spc="0" normalizeH="0" baseline="0" noProof="0" dirty="0">
+                <a:ln>
+                  <a:noFill/>
+                </a:ln>
+                <a:solidFill>
+                  <a:srgbClr val="2AA0D6"/>
+                </a:solidFill>
+                <a:effectLst/>
+                <a:uLnTx/>
+                <a:uFillTx/>
+                <a:latin typeface="Segoe UI" panose="020B0502040204020203" pitchFamily="34" charset="0"/>
+                <a:ea typeface="+mn-ea"/>
+                <a:cs typeface="Segoe UI" panose="020B0502040204020203" pitchFamily="34" charset="0"/>
+              </a:endParaRPr>
+            </a:p>
+            <a:p>
+              <a:pPr marR="0" lvl="0" algn="l" defTabSz="914400" rtl="0" eaLnBrk="1" fontAlgn="auto" latinLnBrk="0" hangingPunct="1">
+                <a:lnSpc>
+                  <a:spcPct val="100000"/>
+                </a:lnSpc>
+                <a:spcBef>
+                  <a:spcPts val="0"/>
+                </a:spcBef>
+                <a:spcAft>
+                  <a:spcPts val="0"/>
+                </a:spcAft>
+                <a:buClrTx/>
+                <a:buSzTx/>
+                <a:tabLst/>
+                <a:defRPr/>
+              </a:pPr>
+              <a:endParaRPr kumimoji="0" lang="en-US" sz="1200" b="0" i="0" u="none" strike="noStrike" kern="1200" cap="none" spc="0" normalizeH="0" baseline="0" noProof="0" dirty="0">
+                <a:ln>
+                  <a:noFill/>
+                </a:ln>
+                <a:solidFill>
+                  <a:srgbClr val="2AA0D6"/>
+                </a:solidFill>
+                <a:effectLst/>
+                <a:uLnTx/>
+                <a:uFillTx/>
+                <a:latin typeface="Segoe UI" panose="020B0502040204020203" pitchFamily="34" charset="0"/>
+                <a:ea typeface="+mn-ea"/>
+                <a:cs typeface="Segoe UI" panose="020B0502040204020203" pitchFamily="34" charset="0"/>
+              </a:endParaRPr>
+            </a:p>
+            <a:p>
+              <a:pPr marL="171450" marR="0" lvl="0" indent="-171450" algn="l" defTabSz="914400" rtl="0" eaLnBrk="1" fontAlgn="auto" latinLnBrk="0" hangingPunct="1">
+                <a:lnSpc>
+                  <a:spcPct val="100000"/>
+                </a:lnSpc>
+                <a:spcBef>
+                  <a:spcPts val="0"/>
+                </a:spcBef>
+                <a:spcAft>
+                  <a:spcPts val="0"/>
+                </a:spcAft>
+                <a:buClrTx/>
+                <a:buSzTx/>
+                <a:buFont typeface="Arial" panose="020B0604020202020204" pitchFamily="34" charset="0"/>
+                <a:buChar char="•"/>
+                <a:tabLst/>
+                <a:defRPr/>
+              </a:pPr>
+              <a:r>
+                <a:rPr kumimoji="0" lang="en-US" sz="1200" b="0" i="0" u="none" strike="noStrike" kern="1200" cap="none" spc="0" normalizeH="0" baseline="0" noProof="0" dirty="0">
+                  <a:ln>
+                    <a:noFill/>
+                  </a:ln>
+                  <a:solidFill>
+                    <a:srgbClr val="2AA0D6"/>
+                  </a:solidFill>
+                  <a:effectLst/>
+                  <a:uLnTx/>
+                  <a:uFillTx/>
+                  <a:latin typeface="Segoe UI" panose="020B0502040204020203" pitchFamily="34" charset="0"/>
+                  <a:ea typeface="+mn-ea"/>
+                  <a:cs typeface="Segoe UI" panose="020B0502040204020203" pitchFamily="34" charset="0"/>
+                </a:rPr>
+                <a:t>Factors affecting the behavior</a:t>
+              </a:r>
+              <a:r>
+                <a:rPr lang="en-US" sz="1200" dirty="0">
+                  <a:solidFill>
+                    <a:srgbClr val="2AA0D6"/>
+                  </a:solidFill>
+                  <a:latin typeface="Segoe UI" panose="020B0502040204020203" pitchFamily="34" charset="0"/>
+                  <a:cs typeface="Segoe UI" panose="020B0502040204020203" pitchFamily="34" charset="0"/>
+                </a:rPr>
+                <a:t> of publicly-traded space exploration equities.</a:t>
+              </a:r>
+              <a:endParaRPr kumimoji="0" lang="en-US" sz="1200" b="0" i="0" u="none" strike="noStrike" kern="1200" cap="none" spc="0" normalizeH="0" baseline="0" noProof="0" dirty="0">
+                <a:ln>
+                  <a:noFill/>
+                </a:ln>
+                <a:solidFill>
+                  <a:srgbClr val="2AA0D6"/>
+                </a:solidFill>
+                <a:effectLst/>
+                <a:uLnTx/>
+                <a:uFillTx/>
+                <a:latin typeface="Segoe UI" panose="020B0502040204020203" pitchFamily="34" charset="0"/>
+                <a:ea typeface="+mn-ea"/>
+                <a:cs typeface="Segoe UI" panose="020B0502040204020203" pitchFamily="34" charset="0"/>
+              </a:endParaRPr>
+            </a:p>
+            <a:p>
+              <a:pPr algn="ctr"/>
+              <a:endParaRPr lang="en-US" sz="1600" dirty="0">
+                <a:solidFill>
+                  <a:srgbClr val="2AA0D6"/>
+                </a:solidFill>
+                <a:latin typeface="Segoe UI" panose="020B0502040204020203" pitchFamily="34" charset="0"/>
+                <a:cs typeface="Segoe UI" panose="020B0502040204020203" pitchFamily="34" charset="0"/>
+              </a:endParaRPr>
             </a:p>
           </p:txBody>
         </p:sp>
-      </p:grpSp>
-      <p:pic>
-        <p:nvPicPr>
-          <p:cNvPr id="8" name="Graphic 7" descr="Earth globe: Americas with solid fill">
-            <a:extLst>
-              <a:ext uri="{FF2B5EF4-FFF2-40B4-BE49-F238E27FC236}">
-                <a16:creationId xmlns:a16="http://schemas.microsoft.com/office/drawing/2014/main" id="{3269944C-B78D-7600-27E8-EBACD8BCB4CD}"/>
-              </a:ext>
-            </a:extLst>
-          </p:cNvPr>
-          <p:cNvPicPr>
-            <a:picLocks noChangeAspect="1"/>
-          </p:cNvPicPr>
-          <p:nvPr/>
-        </p:nvPicPr>
-        <p:blipFill>
-          <a:blip r:embed="rId2">
-            <a:extLst>
-              <a:ext uri="{96DAC541-7B7A-43D3-8B79-37D633B846F1}">
-                <asvg:svgBlip xmlns:asvg="http://schemas.microsoft.com/office/drawing/2016/SVG/main" r:embed="rId3"/>
-              </a:ext>
-            </a:extLst>
-          </a:blip>
-          <a:stretch>
-            <a:fillRect/>
-          </a:stretch>
-        </p:blipFill>
-        <p:spPr>
-          <a:xfrm>
-            <a:off x="5089152" y="3138868"/>
-            <a:ext cx="1980000" cy="1980000"/>
-          </a:xfrm>
-          <a:prstGeom prst="rect">
-            <a:avLst/>
-          </a:prstGeom>
-        </p:spPr>
-      </p:pic>
-      <p:sp>
-        <p:nvSpPr>
-          <p:cNvPr id="4" name="Rounded Rectangle 3">
-            <a:extLst>
-              <a:ext uri="{FF2B5EF4-FFF2-40B4-BE49-F238E27FC236}">
-                <a16:creationId xmlns:a16="http://schemas.microsoft.com/office/drawing/2014/main" id="{9259966F-6E31-7D91-F917-71B3D8DF14AD}"/>
-              </a:ext>
-            </a:extLst>
-          </p:cNvPr>
-          <p:cNvSpPr/>
-          <p:nvPr/>
-        </p:nvSpPr>
-        <p:spPr>
-          <a:xfrm>
-            <a:off x="3745706" y="304841"/>
-            <a:ext cx="4700588" cy="1328738"/>
-          </a:xfrm>
-          <a:prstGeom prst="roundRect">
-            <a:avLst/>
-          </a:prstGeom>
-          <a:solidFill>
-            <a:srgbClr val="2AA0D6"/>
-          </a:solidFill>
-          <a:ln>
-            <a:noFill/>
-          </a:ln>
-        </p:spPr>
-        <p:style>
-          <a:lnRef idx="2">
-            <a:schemeClr val="accent1">
-              <a:shade val="15000"/>
-            </a:schemeClr>
-          </a:lnRef>
-          <a:fillRef idx="1">
-            <a:schemeClr val="accent1"/>
-          </a:fillRef>
-          <a:effectRef idx="0">
-            <a:schemeClr val="accent1"/>
-          </a:effectRef>
-          <a:fontRef idx="minor">
-            <a:schemeClr val="lt1"/>
-          </a:fontRef>
-        </p:style>
-        <p:txBody>
-          <a:bodyPr rtlCol="0" anchor="ctr"/>
-          <a:lstStyle/>
-          <a:p>
-            <a:pPr algn="ctr"/>
-            <a:r>
-              <a:rPr lang="en-US" sz="2400" dirty="0">
-                <a:latin typeface="Segoe UI" panose="020F0502020204030204" pitchFamily="34" charset="0"/>
-                <a:cs typeface="Segoe UI" panose="020F0502020204030204" pitchFamily="34" charset="0"/>
-              </a:rPr>
-              <a:t>Space Exploration in Time Series</a:t>
-            </a:r>
-          </a:p>
-        </p:txBody>
-      </p:sp>
-      <p:pic>
-        <p:nvPicPr>
-          <p:cNvPr id="10" name="Graphic 9" descr="Mercury with solid fill">
-            <a:extLst>
-              <a:ext uri="{FF2B5EF4-FFF2-40B4-BE49-F238E27FC236}">
-                <a16:creationId xmlns:a16="http://schemas.microsoft.com/office/drawing/2014/main" id="{39CB9F07-E457-670A-8BCF-ECFC33D88231}"/>
-              </a:ext>
-            </a:extLst>
-          </p:cNvPr>
-          <p:cNvPicPr>
-            <a:picLocks noChangeAspect="1"/>
-          </p:cNvPicPr>
-          <p:nvPr/>
-        </p:nvPicPr>
-        <p:blipFill>
-          <a:blip r:embed="rId4">
-            <a:extLst>
-              <a:ext uri="{96DAC541-7B7A-43D3-8B79-37D633B846F1}">
-                <asvg:svgBlip xmlns:asvg="http://schemas.microsoft.com/office/drawing/2016/SVG/main" r:embed="rId5"/>
-              </a:ext>
-            </a:extLst>
-          </a:blip>
-          <a:stretch>
-            <a:fillRect/>
-          </a:stretch>
-        </p:blipFill>
-        <p:spPr>
-          <a:xfrm>
-            <a:off x="252762" y="3084004"/>
-            <a:ext cx="2160000" cy="2160000"/>
-          </a:xfrm>
-          <a:prstGeom prst="rect">
-            <a:avLst/>
-          </a:prstGeom>
-        </p:spPr>
-      </p:pic>
-      <p:pic>
-        <p:nvPicPr>
-          <p:cNvPr id="14" name="Graphic 13" descr="Venus with solid fill">
-            <a:extLst>
-              <a:ext uri="{FF2B5EF4-FFF2-40B4-BE49-F238E27FC236}">
-                <a16:creationId xmlns:a16="http://schemas.microsoft.com/office/drawing/2014/main" id="{C9C13A1D-38BD-F694-AC8A-AD1FF0E52042}"/>
-              </a:ext>
-            </a:extLst>
-          </p:cNvPr>
-          <p:cNvPicPr>
-            <a:picLocks noChangeAspect="1"/>
-          </p:cNvPicPr>
-          <p:nvPr/>
-        </p:nvPicPr>
-        <p:blipFill>
-          <a:blip r:embed="rId6">
-            <a:extLst>
-              <a:ext uri="{96DAC541-7B7A-43D3-8B79-37D633B846F1}">
-                <asvg:svgBlip xmlns:asvg="http://schemas.microsoft.com/office/drawing/2016/SVG/main" r:embed="rId7"/>
-              </a:ext>
-            </a:extLst>
-          </a:blip>
-          <a:stretch>
-            <a:fillRect/>
-          </a:stretch>
-        </p:blipFill>
-        <p:spPr>
-          <a:xfrm>
-            <a:off x="2636012" y="3084004"/>
-            <a:ext cx="2160000" cy="2160000"/>
-          </a:xfrm>
-          <a:prstGeom prst="rect">
-            <a:avLst/>
-          </a:prstGeom>
-        </p:spPr>
-      </p:pic>
-      <p:pic>
-        <p:nvPicPr>
-          <p:cNvPr id="18" name="Graphic 17" descr="Mars with solid fill">
-            <a:extLst>
-              <a:ext uri="{FF2B5EF4-FFF2-40B4-BE49-F238E27FC236}">
-                <a16:creationId xmlns:a16="http://schemas.microsoft.com/office/drawing/2014/main" id="{5BEC2E3B-3576-ECA8-CC4E-C0570A9799A9}"/>
-              </a:ext>
-            </a:extLst>
-          </p:cNvPr>
-          <p:cNvPicPr>
-            <a:picLocks noChangeAspect="1"/>
-          </p:cNvPicPr>
-          <p:nvPr/>
-        </p:nvPicPr>
-        <p:blipFill>
-          <a:blip r:embed="rId8">
-            <a:extLst>
-              <a:ext uri="{96DAC541-7B7A-43D3-8B79-37D633B846F1}">
-                <asvg:svgBlip xmlns:asvg="http://schemas.microsoft.com/office/drawing/2016/SVG/main" r:embed="rId9"/>
-              </a:ext>
-            </a:extLst>
-          </a:blip>
-          <a:stretch>
-            <a:fillRect/>
-          </a:stretch>
-        </p:blipFill>
-        <p:spPr>
-          <a:xfrm>
-            <a:off x="7392378" y="3084004"/>
-            <a:ext cx="2160000" cy="2160000"/>
-          </a:xfrm>
-          <a:prstGeom prst="rect">
-            <a:avLst/>
-          </a:prstGeom>
-        </p:spPr>
-      </p:pic>
-      <p:pic>
-        <p:nvPicPr>
-          <p:cNvPr id="22" name="Graphic 21" descr="Jupiter with solid fill">
-            <a:extLst>
-              <a:ext uri="{FF2B5EF4-FFF2-40B4-BE49-F238E27FC236}">
-                <a16:creationId xmlns:a16="http://schemas.microsoft.com/office/drawing/2014/main" id="{AB148851-8344-228E-2DF0-B2EC44E12451}"/>
-              </a:ext>
-            </a:extLst>
-          </p:cNvPr>
-          <p:cNvPicPr>
-            <a:picLocks noChangeAspect="1"/>
-          </p:cNvPicPr>
-          <p:nvPr/>
-        </p:nvPicPr>
-        <p:blipFill>
-          <a:blip r:embed="rId10">
-            <a:extLst>
-              <a:ext uri="{96DAC541-7B7A-43D3-8B79-37D633B846F1}">
-                <asvg:svgBlip xmlns:asvg="http://schemas.microsoft.com/office/drawing/2016/SVG/main" r:embed="rId11"/>
-              </a:ext>
-            </a:extLst>
-          </a:blip>
-          <a:stretch>
-            <a:fillRect/>
-          </a:stretch>
-        </p:blipFill>
-        <p:spPr>
-          <a:xfrm>
-            <a:off x="9760950" y="3084004"/>
-            <a:ext cx="2160000" cy="2160000"/>
-          </a:xfrm>
-          <a:prstGeom prst="rect">
-            <a:avLst/>
-          </a:prstGeom>
-        </p:spPr>
-      </p:pic>
-      <p:cxnSp>
-        <p:nvCxnSpPr>
-          <p:cNvPr id="27" name="Elbow Connector 26">
-            <a:extLst>
-              <a:ext uri="{FF2B5EF4-FFF2-40B4-BE49-F238E27FC236}">
-                <a16:creationId xmlns:a16="http://schemas.microsoft.com/office/drawing/2014/main" id="{9E245B75-CE2C-8E67-09EE-F0B4E9364A60}"/>
-              </a:ext>
-            </a:extLst>
-          </p:cNvPr>
-          <p:cNvCxnSpPr>
-            <a:cxnSpLocks/>
-            <a:stCxn id="4" idx="2"/>
-            <a:endCxn id="57" idx="0"/>
-          </p:cNvCxnSpPr>
-          <p:nvPr/>
-        </p:nvCxnSpPr>
-        <p:spPr>
-          <a:xfrm rot="5400000">
-            <a:off x="2840451" y="121122"/>
-            <a:ext cx="1743093" cy="4768006"/>
-          </a:xfrm>
-          <a:prstGeom prst="bentConnector3">
-            <a:avLst>
-              <a:gd name="adj1" fmla="val 50000"/>
-            </a:avLst>
-          </a:prstGeom>
-          <a:ln w="63500">
+        <p:sp>
+          <p:nvSpPr>
+            <p:cNvPr id="50" name="Rectangle 49">
+              <a:extLst>
+                <a:ext uri="{FF2B5EF4-FFF2-40B4-BE49-F238E27FC236}">
+                  <a16:creationId xmlns:a16="http://schemas.microsoft.com/office/drawing/2014/main" id="{303A75ED-E444-A7C4-F7F6-4497EB13BFD6}"/>
+                </a:ext>
+              </a:extLst>
+            </p:cNvPr>
+            <p:cNvSpPr/>
+            <p:nvPr/>
+          </p:nvSpPr>
+          <p:spPr>
+            <a:xfrm>
+              <a:off x="9734855" y="4723351"/>
+              <a:ext cx="2160000" cy="1471386"/>
+            </a:xfrm>
+            <a:prstGeom prst="rect">
+              <a:avLst/>
+            </a:prstGeom>
             <a:solidFill>
-              <a:srgbClr val="2AA0D6"/>
+              <a:schemeClr val="bg1"/>
             </a:solidFill>
-            <a:tailEnd type="triangle"/>
-          </a:ln>
-        </p:spPr>
-        <p:style>
-          <a:lnRef idx="1">
-            <a:schemeClr val="accent1"/>
-          </a:lnRef>
-          <a:fillRef idx="0">
-            <a:schemeClr val="accent1"/>
-          </a:fillRef>
-          <a:effectRef idx="0">
-            <a:schemeClr val="accent1"/>
-          </a:effectRef>
-          <a:fontRef idx="minor">
-            <a:schemeClr val="tx1"/>
-          </a:fontRef>
-        </p:style>
-      </p:cxnSp>
-      <p:cxnSp>
-        <p:nvCxnSpPr>
-          <p:cNvPr id="33" name="Elbow Connector 32">
-            <a:extLst>
-              <a:ext uri="{FF2B5EF4-FFF2-40B4-BE49-F238E27FC236}">
-                <a16:creationId xmlns:a16="http://schemas.microsoft.com/office/drawing/2014/main" id="{45DC433E-AFA1-DC52-7862-4BD8592C8372}"/>
-              </a:ext>
-            </a:extLst>
-          </p:cNvPr>
-          <p:cNvCxnSpPr>
-            <a:cxnSpLocks/>
-            <a:stCxn id="4" idx="2"/>
-            <a:endCxn id="62" idx="0"/>
-          </p:cNvCxnSpPr>
-          <p:nvPr/>
-        </p:nvCxnSpPr>
-        <p:spPr>
-          <a:xfrm rot="16200000" flipH="1">
-            <a:off x="6407809" y="1321769"/>
-            <a:ext cx="1743093" cy="2366711"/>
-          </a:xfrm>
-          <a:prstGeom prst="bentConnector3">
-            <a:avLst/>
-          </a:prstGeom>
-          <a:ln w="63500">
-            <a:solidFill>
-              <a:srgbClr val="2AA0D6"/>
-            </a:solidFill>
-            <a:tailEnd type="triangle"/>
-          </a:ln>
-        </p:spPr>
-        <p:style>
-          <a:lnRef idx="1">
-            <a:schemeClr val="accent1"/>
-          </a:lnRef>
-          <a:fillRef idx="0">
-            <a:schemeClr val="accent1"/>
-          </a:fillRef>
-          <a:effectRef idx="0">
-            <a:schemeClr val="accent1"/>
-          </a:effectRef>
-          <a:fontRef idx="minor">
-            <a:schemeClr val="tx1"/>
-          </a:fontRef>
-        </p:style>
-      </p:cxnSp>
-      <p:cxnSp>
-        <p:nvCxnSpPr>
-          <p:cNvPr id="38" name="Straight Arrow Connector 37">
-            <a:extLst>
-              <a:ext uri="{FF2B5EF4-FFF2-40B4-BE49-F238E27FC236}">
-                <a16:creationId xmlns:a16="http://schemas.microsoft.com/office/drawing/2014/main" id="{07410A4A-0EA4-34CA-5B98-B26FAF0C5B46}"/>
-              </a:ext>
-            </a:extLst>
-          </p:cNvPr>
-          <p:cNvCxnSpPr>
-            <a:cxnSpLocks/>
-            <a:stCxn id="4" idx="2"/>
-            <a:endCxn id="61" idx="0"/>
-          </p:cNvCxnSpPr>
-          <p:nvPr/>
-        </p:nvCxnSpPr>
-        <p:spPr>
-          <a:xfrm flipH="1">
-            <a:off x="6084472" y="1633579"/>
-            <a:ext cx="11528" cy="1688552"/>
-          </a:xfrm>
-          <a:prstGeom prst="straightConnector1">
-            <a:avLst/>
-          </a:prstGeom>
-          <a:ln w="63500">
-            <a:solidFill>
-              <a:srgbClr val="2AA0D6"/>
-            </a:solidFill>
-            <a:tailEnd type="triangle"/>
-          </a:ln>
-        </p:spPr>
-        <p:style>
-          <a:lnRef idx="1">
-            <a:schemeClr val="accent1"/>
-          </a:lnRef>
-          <a:fillRef idx="0">
-            <a:schemeClr val="accent1"/>
-          </a:fillRef>
-          <a:effectRef idx="0">
-            <a:schemeClr val="accent1"/>
-          </a:effectRef>
-          <a:fontRef idx="minor">
-            <a:schemeClr val="tx1"/>
-          </a:fontRef>
-        </p:style>
-      </p:cxnSp>
-      <p:cxnSp>
-        <p:nvCxnSpPr>
-          <p:cNvPr id="40" name="Elbow Connector 39">
-            <a:extLst>
-              <a:ext uri="{FF2B5EF4-FFF2-40B4-BE49-F238E27FC236}">
-                <a16:creationId xmlns:a16="http://schemas.microsoft.com/office/drawing/2014/main" id="{CEC137CD-431C-E8FD-00A9-DA76AB41668B}"/>
-              </a:ext>
-            </a:extLst>
-          </p:cNvPr>
-          <p:cNvCxnSpPr>
-            <a:cxnSpLocks/>
-            <a:stCxn id="4" idx="2"/>
-            <a:endCxn id="60" idx="0"/>
-          </p:cNvCxnSpPr>
-          <p:nvPr/>
-        </p:nvCxnSpPr>
-        <p:spPr>
-          <a:xfrm rot="5400000">
-            <a:off x="4029571" y="1310242"/>
-            <a:ext cx="1743093" cy="2389767"/>
-          </a:xfrm>
-          <a:prstGeom prst="bentConnector3">
-            <a:avLst>
-              <a:gd name="adj1" fmla="val 50000"/>
-            </a:avLst>
-          </a:prstGeom>
-          <a:ln w="63500">
-            <a:solidFill>
-              <a:srgbClr val="2AA0D6"/>
-            </a:solidFill>
-            <a:tailEnd type="triangle"/>
-          </a:ln>
-        </p:spPr>
-        <p:style>
-          <a:lnRef idx="1">
-            <a:schemeClr val="accent1"/>
-          </a:lnRef>
-          <a:fillRef idx="0">
-            <a:schemeClr val="accent1"/>
-          </a:fillRef>
-          <a:effectRef idx="0">
-            <a:schemeClr val="accent1"/>
-          </a:effectRef>
-          <a:fontRef idx="minor">
-            <a:schemeClr val="tx1"/>
-          </a:fontRef>
-        </p:style>
-      </p:cxnSp>
-      <p:sp>
-        <p:nvSpPr>
-          <p:cNvPr id="46" name="Rectangle 45">
-            <a:extLst>
-              <a:ext uri="{FF2B5EF4-FFF2-40B4-BE49-F238E27FC236}">
-                <a16:creationId xmlns:a16="http://schemas.microsoft.com/office/drawing/2014/main" id="{CDA432F8-094C-F07C-F214-26F585D938DC}"/>
-              </a:ext>
-            </a:extLst>
-          </p:cNvPr>
-          <p:cNvSpPr/>
-          <p:nvPr/>
-        </p:nvSpPr>
-        <p:spPr>
-          <a:xfrm>
-            <a:off x="379314" y="4713340"/>
-            <a:ext cx="1908000" cy="1080000"/>
-          </a:xfrm>
-          <a:prstGeom prst="rect">
-            <a:avLst/>
-          </a:prstGeom>
-          <a:solidFill>
-            <a:schemeClr val="bg1"/>
-          </a:solidFill>
-          <a:ln>
-            <a:solidFill>
-              <a:srgbClr val="2AA0D6"/>
-            </a:solidFill>
-          </a:ln>
-        </p:spPr>
-        <p:style>
-          <a:lnRef idx="2">
-            <a:schemeClr val="accent1">
-              <a:shade val="15000"/>
-            </a:schemeClr>
-          </a:lnRef>
-          <a:fillRef idx="1">
-            <a:schemeClr val="accent1"/>
-          </a:fillRef>
-          <a:effectRef idx="0">
-            <a:schemeClr val="accent1"/>
-          </a:effectRef>
-          <a:fontRef idx="minor">
-            <a:schemeClr val="lt1"/>
-          </a:fontRef>
-        </p:style>
-        <p:txBody>
-          <a:bodyPr rtlCol="0" anchor="ctr"/>
-          <a:lstStyle/>
-          <a:p>
-            <a:pPr algn="ctr"/>
-            <a:r>
-              <a:rPr lang="en-US" dirty="0">
+            <a:ln>
+              <a:solidFill>
+                <a:srgbClr val="2AA0D6"/>
+              </a:solidFill>
+            </a:ln>
+          </p:spPr>
+          <p:style>
+            <a:lnRef idx="2">
+              <a:schemeClr val="accent1">
+                <a:shade val="15000"/>
+              </a:schemeClr>
+            </a:lnRef>
+            <a:fillRef idx="1">
+              <a:schemeClr val="accent1"/>
+            </a:fillRef>
+            <a:effectRef idx="0">
+              <a:schemeClr val="accent1"/>
+            </a:effectRef>
+            <a:fontRef idx="minor">
+              <a:schemeClr val="lt1"/>
+            </a:fontRef>
+          </p:style>
+          <p:txBody>
+            <a:bodyPr rtlCol="0" anchor="t"/>
+            <a:lstStyle/>
+            <a:p>
+              <a:pPr algn="ctr"/>
+              <a:r>
+                <a:rPr lang="en-US" sz="1600" dirty="0">
+                  <a:solidFill>
+                    <a:srgbClr val="2AA0D6"/>
+                  </a:solidFill>
+                  <a:latin typeface="Segoe UI" panose="020B0502040204020203" pitchFamily="34" charset="0"/>
+                  <a:cs typeface="Segoe UI" panose="020B0502040204020203" pitchFamily="34" charset="0"/>
+                </a:rPr>
+                <a:t>Global Involvement</a:t>
+              </a:r>
+            </a:p>
+            <a:p>
+              <a:pPr marR="0" lvl="0" algn="l" defTabSz="914400" rtl="0" eaLnBrk="1" fontAlgn="auto" latinLnBrk="0" hangingPunct="1">
+                <a:lnSpc>
+                  <a:spcPct val="100000"/>
+                </a:lnSpc>
+                <a:spcBef>
+                  <a:spcPts val="0"/>
+                </a:spcBef>
+                <a:spcAft>
+                  <a:spcPts val="0"/>
+                </a:spcAft>
+                <a:buClrTx/>
+                <a:buSzTx/>
+                <a:tabLst/>
+                <a:defRPr/>
+              </a:pPr>
+              <a:endParaRPr kumimoji="0" lang="en-US" sz="1200" b="0" i="0" u="none" strike="noStrike" kern="1200" cap="none" spc="0" normalizeH="0" baseline="0" noProof="0" dirty="0">
+                <a:ln>
+                  <a:noFill/>
+                </a:ln>
                 <a:solidFill>
                   <a:srgbClr val="2AA0D6"/>
                 </a:solidFill>
-              </a:rPr>
-              <a:t>Public Sector Space Exploration</a:t>
-            </a:r>
-          </a:p>
-        </p:txBody>
-      </p:sp>
-      <p:sp>
-        <p:nvSpPr>
-          <p:cNvPr id="47" name="Rectangle 46">
-            <a:extLst>
-              <a:ext uri="{FF2B5EF4-FFF2-40B4-BE49-F238E27FC236}">
-                <a16:creationId xmlns:a16="http://schemas.microsoft.com/office/drawing/2014/main" id="{D7CC336E-60AD-60E9-195E-87D5A9A3EB26}"/>
-              </a:ext>
-            </a:extLst>
-          </p:cNvPr>
-          <p:cNvSpPr/>
-          <p:nvPr/>
-        </p:nvSpPr>
-        <p:spPr>
-          <a:xfrm>
-            <a:off x="2752233" y="4713340"/>
-            <a:ext cx="1908000" cy="1080000"/>
-          </a:xfrm>
-          <a:prstGeom prst="rect">
-            <a:avLst/>
-          </a:prstGeom>
-          <a:solidFill>
-            <a:schemeClr val="bg1"/>
-          </a:solidFill>
-          <a:ln>
-            <a:solidFill>
-              <a:srgbClr val="2AA0D6"/>
-            </a:solidFill>
-          </a:ln>
-        </p:spPr>
-        <p:style>
-          <a:lnRef idx="2">
-            <a:schemeClr val="accent1">
-              <a:shade val="15000"/>
-            </a:schemeClr>
-          </a:lnRef>
-          <a:fillRef idx="1">
-            <a:schemeClr val="accent1"/>
-          </a:fillRef>
-          <a:effectRef idx="0">
-            <a:schemeClr val="accent1"/>
-          </a:effectRef>
-          <a:fontRef idx="minor">
-            <a:schemeClr val="lt1"/>
-          </a:fontRef>
-        </p:style>
-        <p:txBody>
-          <a:bodyPr rtlCol="0" anchor="ctr"/>
-          <a:lstStyle/>
-          <a:p>
-            <a:pPr algn="ctr"/>
-            <a:r>
-              <a:rPr lang="en-US" dirty="0">
+                <a:effectLst/>
+                <a:uLnTx/>
+                <a:uFillTx/>
+                <a:latin typeface="Segoe UI" panose="020B0502040204020203" pitchFamily="34" charset="0"/>
+                <a:ea typeface="+mn-ea"/>
+                <a:cs typeface="Segoe UI" panose="020B0502040204020203" pitchFamily="34" charset="0"/>
+              </a:endParaRPr>
+            </a:p>
+            <a:p>
+              <a:pPr marL="171450" marR="0" lvl="0" indent="-171450" algn="l" defTabSz="914400" rtl="0" eaLnBrk="1" fontAlgn="auto" latinLnBrk="0" hangingPunct="1">
+                <a:lnSpc>
+                  <a:spcPct val="100000"/>
+                </a:lnSpc>
+                <a:spcBef>
+                  <a:spcPts val="0"/>
+                </a:spcBef>
+                <a:spcAft>
+                  <a:spcPts val="0"/>
+                </a:spcAft>
+                <a:buClrTx/>
+                <a:buSzTx/>
+                <a:buFont typeface="Arial" panose="020B0604020202020204" pitchFamily="34" charset="0"/>
+                <a:buChar char="•"/>
+                <a:tabLst/>
+                <a:defRPr/>
+              </a:pPr>
+              <a:r>
+                <a:rPr kumimoji="0" lang="en-US" sz="1200" b="0" i="0" u="none" strike="noStrike" kern="1200" cap="none" spc="0" normalizeH="0" baseline="0" noProof="0" dirty="0">
+                  <a:ln>
+                    <a:noFill/>
+                  </a:ln>
+                  <a:solidFill>
+                    <a:srgbClr val="2AA0D6"/>
+                  </a:solidFill>
+                  <a:effectLst/>
+                  <a:uLnTx/>
+                  <a:uFillTx/>
+                  <a:latin typeface="Segoe UI" panose="020B0502040204020203" pitchFamily="34" charset="0"/>
+                  <a:ea typeface="+mn-ea"/>
+                  <a:cs typeface="Segoe UI" panose="020B0502040204020203" pitchFamily="34" charset="0"/>
+                </a:rPr>
+                <a:t>Changes in the composition of players in space exploration missions over time.</a:t>
+              </a:r>
+            </a:p>
+            <a:p>
+              <a:pPr algn="ctr"/>
+              <a:endParaRPr lang="en-US" sz="1600" dirty="0">
                 <a:solidFill>
                   <a:srgbClr val="2AA0D6"/>
                 </a:solidFill>
-              </a:rPr>
-              <a:t>Public Interest in Space Exploration</a:t>
-            </a:r>
-          </a:p>
-        </p:txBody>
-      </p:sp>
-      <p:sp>
-        <p:nvSpPr>
-          <p:cNvPr id="48" name="Rectangle 47">
-            <a:extLst>
-              <a:ext uri="{FF2B5EF4-FFF2-40B4-BE49-F238E27FC236}">
-                <a16:creationId xmlns:a16="http://schemas.microsoft.com/office/drawing/2014/main" id="{87A54DA6-4E13-5387-15D9-3E705B2C2100}"/>
-              </a:ext>
-            </a:extLst>
-          </p:cNvPr>
-          <p:cNvSpPr/>
-          <p:nvPr/>
-        </p:nvSpPr>
-        <p:spPr>
-          <a:xfrm>
-            <a:off x="5125152" y="4723351"/>
-            <a:ext cx="1908000" cy="1080000"/>
-          </a:xfrm>
-          <a:prstGeom prst="rect">
-            <a:avLst/>
-          </a:prstGeom>
-          <a:solidFill>
-            <a:schemeClr val="bg1"/>
-          </a:solidFill>
-          <a:ln>
-            <a:solidFill>
-              <a:srgbClr val="2AA0D6"/>
-            </a:solidFill>
-          </a:ln>
-        </p:spPr>
-        <p:style>
-          <a:lnRef idx="2">
-            <a:schemeClr val="accent1">
-              <a:shade val="15000"/>
-            </a:schemeClr>
-          </a:lnRef>
-          <a:fillRef idx="1">
-            <a:schemeClr val="accent1"/>
-          </a:fillRef>
-          <a:effectRef idx="0">
-            <a:schemeClr val="accent1"/>
-          </a:effectRef>
-          <a:fontRef idx="minor">
-            <a:schemeClr val="lt1"/>
-          </a:fontRef>
-        </p:style>
-        <p:txBody>
-          <a:bodyPr rtlCol="0" anchor="ctr"/>
-          <a:lstStyle/>
-          <a:p>
-            <a:pPr algn="ctr"/>
-            <a:r>
-              <a:rPr lang="en-US" dirty="0">
-                <a:solidFill>
-                  <a:srgbClr val="2AA0D6"/>
-                </a:solidFill>
-              </a:rPr>
-              <a:t>Use of Space Infrastructure</a:t>
-            </a:r>
-          </a:p>
-        </p:txBody>
-      </p:sp>
-      <p:sp>
-        <p:nvSpPr>
-          <p:cNvPr id="49" name="Rectangle 48">
-            <a:extLst>
-              <a:ext uri="{FF2B5EF4-FFF2-40B4-BE49-F238E27FC236}">
-                <a16:creationId xmlns:a16="http://schemas.microsoft.com/office/drawing/2014/main" id="{403BF609-329D-AEC5-54B3-1C01E33D86AB}"/>
-              </a:ext>
-            </a:extLst>
-          </p:cNvPr>
-          <p:cNvSpPr/>
-          <p:nvPr/>
-        </p:nvSpPr>
-        <p:spPr>
-          <a:xfrm>
-            <a:off x="7518378" y="4723351"/>
-            <a:ext cx="1908000" cy="1080000"/>
-          </a:xfrm>
-          <a:prstGeom prst="rect">
-            <a:avLst/>
-          </a:prstGeom>
-          <a:solidFill>
-            <a:schemeClr val="bg1"/>
-          </a:solidFill>
-          <a:ln>
-            <a:solidFill>
-              <a:srgbClr val="2AA0D6"/>
-            </a:solidFill>
-          </a:ln>
-        </p:spPr>
-        <p:style>
-          <a:lnRef idx="2">
-            <a:schemeClr val="accent1">
-              <a:shade val="15000"/>
-            </a:schemeClr>
-          </a:lnRef>
-          <a:fillRef idx="1">
-            <a:schemeClr val="accent1"/>
-          </a:fillRef>
-          <a:effectRef idx="0">
-            <a:schemeClr val="accent1"/>
-          </a:effectRef>
-          <a:fontRef idx="minor">
-            <a:schemeClr val="lt1"/>
-          </a:fontRef>
-        </p:style>
-        <p:txBody>
-          <a:bodyPr rtlCol="0" anchor="ctr"/>
-          <a:lstStyle/>
-          <a:p>
-            <a:pPr algn="ctr"/>
-            <a:r>
-              <a:rPr lang="en-US" dirty="0">
-                <a:solidFill>
-                  <a:srgbClr val="2AA0D6"/>
-                </a:solidFill>
-              </a:rPr>
-              <a:t>Private Sector Space Exploration</a:t>
-            </a:r>
-          </a:p>
-        </p:txBody>
-      </p:sp>
-      <p:sp>
-        <p:nvSpPr>
-          <p:cNvPr id="50" name="Rectangle 49">
-            <a:extLst>
-              <a:ext uri="{FF2B5EF4-FFF2-40B4-BE49-F238E27FC236}">
-                <a16:creationId xmlns:a16="http://schemas.microsoft.com/office/drawing/2014/main" id="{303A75ED-E444-A7C4-F7F6-4497EB13BFD6}"/>
-              </a:ext>
-            </a:extLst>
-          </p:cNvPr>
-          <p:cNvSpPr/>
-          <p:nvPr/>
-        </p:nvSpPr>
-        <p:spPr>
-          <a:xfrm>
-            <a:off x="9887301" y="4723351"/>
-            <a:ext cx="1908000" cy="1080000"/>
-          </a:xfrm>
-          <a:prstGeom prst="rect">
-            <a:avLst/>
-          </a:prstGeom>
-          <a:solidFill>
-            <a:schemeClr val="bg1"/>
-          </a:solidFill>
-          <a:ln>
-            <a:solidFill>
-              <a:srgbClr val="2AA0D6"/>
-            </a:solidFill>
-          </a:ln>
-        </p:spPr>
-        <p:style>
-          <a:lnRef idx="2">
-            <a:schemeClr val="accent1">
-              <a:shade val="15000"/>
-            </a:schemeClr>
-          </a:lnRef>
-          <a:fillRef idx="1">
-            <a:schemeClr val="accent1"/>
-          </a:fillRef>
-          <a:effectRef idx="0">
-            <a:schemeClr val="accent1"/>
-          </a:effectRef>
-          <a:fontRef idx="minor">
-            <a:schemeClr val="lt1"/>
-          </a:fontRef>
-        </p:style>
-        <p:txBody>
-          <a:bodyPr rtlCol="0" anchor="ctr"/>
-          <a:lstStyle/>
-          <a:p>
-            <a:pPr algn="ctr"/>
-            <a:r>
-              <a:rPr lang="en-US" dirty="0">
-                <a:solidFill>
-                  <a:srgbClr val="2AA0D6"/>
-                </a:solidFill>
-              </a:rPr>
-              <a:t>International Participation in Space Exploration</a:t>
-            </a:r>
-          </a:p>
-        </p:txBody>
-      </p:sp>
-      <p:cxnSp>
-        <p:nvCxnSpPr>
-          <p:cNvPr id="69" name="Elbow Connector 68">
-            <a:extLst>
-              <a:ext uri="{FF2B5EF4-FFF2-40B4-BE49-F238E27FC236}">
-                <a16:creationId xmlns:a16="http://schemas.microsoft.com/office/drawing/2014/main" id="{78EA4082-FC21-84B9-89C5-480167EFA6C1}"/>
-              </a:ext>
-            </a:extLst>
-          </p:cNvPr>
-          <p:cNvCxnSpPr>
-            <a:cxnSpLocks/>
-            <a:stCxn id="4" idx="2"/>
-            <a:endCxn id="63" idx="0"/>
-          </p:cNvCxnSpPr>
-          <p:nvPr/>
-        </p:nvCxnSpPr>
-        <p:spPr>
-          <a:xfrm rot="16200000" flipH="1">
-            <a:off x="7596928" y="132650"/>
-            <a:ext cx="1743093" cy="4744949"/>
-          </a:xfrm>
-          <a:prstGeom prst="bentConnector3">
-            <a:avLst>
-              <a:gd name="adj1" fmla="val 50000"/>
-            </a:avLst>
-          </a:prstGeom>
-          <a:ln w="63500">
-            <a:solidFill>
-              <a:srgbClr val="2AA0D6"/>
-            </a:solidFill>
-            <a:tailEnd type="triangle"/>
-          </a:ln>
-        </p:spPr>
-        <p:style>
-          <a:lnRef idx="1">
-            <a:schemeClr val="accent1"/>
-          </a:lnRef>
-          <a:fillRef idx="0">
-            <a:schemeClr val="accent1"/>
-          </a:fillRef>
-          <a:effectRef idx="0">
-            <a:schemeClr val="accent1"/>
-          </a:effectRef>
-          <a:fontRef idx="minor">
-            <a:schemeClr val="tx1"/>
-          </a:fontRef>
-        </p:style>
-      </p:cxnSp>
+                <a:latin typeface="Segoe UI" panose="020B0502040204020203" pitchFamily="34" charset="0"/>
+                <a:cs typeface="Segoe UI" panose="020B0502040204020203" pitchFamily="34" charset="0"/>
+              </a:endParaRPr>
+            </a:p>
+          </p:txBody>
+        </p:sp>
+        <p:cxnSp>
+          <p:nvCxnSpPr>
+            <p:cNvPr id="69" name="Elbow Connector 68">
+              <a:extLst>
+                <a:ext uri="{FF2B5EF4-FFF2-40B4-BE49-F238E27FC236}">
+                  <a16:creationId xmlns:a16="http://schemas.microsoft.com/office/drawing/2014/main" id="{78EA4082-FC21-84B9-89C5-480167EFA6C1}"/>
+                </a:ext>
+              </a:extLst>
+            </p:cNvPr>
+            <p:cNvCxnSpPr>
+              <a:cxnSpLocks/>
+              <a:stCxn id="4" idx="2"/>
+              <a:endCxn id="63" idx="0"/>
+            </p:cNvCxnSpPr>
+            <p:nvPr/>
+          </p:nvCxnSpPr>
+          <p:spPr>
+            <a:xfrm rot="16200000" flipH="1">
+              <a:off x="7596928" y="132650"/>
+              <a:ext cx="1743093" cy="4744949"/>
+            </a:xfrm>
+            <a:prstGeom prst="bentConnector3">
+              <a:avLst>
+                <a:gd name="adj1" fmla="val 50000"/>
+              </a:avLst>
+            </a:prstGeom>
+            <a:ln w="63500">
+              <a:solidFill>
+                <a:srgbClr val="2AA0D6"/>
+              </a:solidFill>
+              <a:tailEnd type="triangle"/>
+            </a:ln>
+          </p:spPr>
+          <p:style>
+            <a:lnRef idx="1">
+              <a:schemeClr val="accent1"/>
+            </a:lnRef>
+            <a:fillRef idx="0">
+              <a:schemeClr val="accent1"/>
+            </a:fillRef>
+            <a:effectRef idx="0">
+              <a:schemeClr val="accent1"/>
+            </a:effectRef>
+            <a:fontRef idx="minor">
+              <a:schemeClr val="tx1"/>
+            </a:fontRef>
+          </p:style>
+        </p:cxnSp>
+      </p:grpSp>
     </p:spTree>
     <p:extLst>
       <p:ext uri="{BB962C8B-B14F-4D97-AF65-F5344CB8AC3E}">

</xml_diff>